<commit_message>
Added plots to presentation
</commit_message>
<xml_diff>
--- a/Gruppe4_Abschlusspraesentation.pptx
+++ b/Gruppe4_Abschlusspraesentation.pptx
@@ -10,13 +10,13 @@
   <p:sldIdLst>
     <p:sldId id="256" r:id="rId2"/>
     <p:sldId id="257" r:id="rId3"/>
-    <p:sldId id="258" r:id="rId4"/>
-    <p:sldId id="266" r:id="rId5"/>
-    <p:sldId id="259" r:id="rId6"/>
-    <p:sldId id="261" r:id="rId7"/>
-    <p:sldId id="264" r:id="rId8"/>
-    <p:sldId id="263" r:id="rId9"/>
-    <p:sldId id="265" r:id="rId10"/>
+    <p:sldId id="266" r:id="rId4"/>
+    <p:sldId id="259" r:id="rId5"/>
+    <p:sldId id="261" r:id="rId6"/>
+    <p:sldId id="264" r:id="rId7"/>
+    <p:sldId id="263" r:id="rId8"/>
+    <p:sldId id="265" r:id="rId9"/>
+    <p:sldId id="267" r:id="rId10"/>
     <p:sldId id="260" r:id="rId11"/>
     <p:sldId id="262" r:id="rId12"/>
   </p:sldIdLst>
@@ -2729,7 +2729,7 @@
         <a:p>
           <a:r>
             <a:rPr lang="en-AU" noProof="0" dirty="0"/>
-            <a:t>More stable and reproducible </a:t>
+            <a:t>(More stable and reproducible) ???? </a:t>
           </a:r>
         </a:p>
       </dgm:t>
@@ -2904,22 +2904,9 @@
         <a:lstStyle/>
         <a:p>
           <a:r>
-            <a:rPr lang="de-DE" dirty="0"/>
-            <a:t>Set </a:t>
+            <a:rPr lang="en-AU" noProof="0" dirty="0"/>
+            <a:t>Set of weights</a:t>
           </a:r>
-          <a:r>
-            <a:rPr lang="de-DE" dirty="0" err="1"/>
-            <a:t>of</a:t>
-          </a:r>
-          <a:r>
-            <a:rPr lang="de-DE" dirty="0"/>
-            <a:t> </a:t>
-          </a:r>
-          <a:r>
-            <a:rPr lang="de-DE" dirty="0" err="1"/>
-            <a:t>weights</a:t>
-          </a:r>
-          <a:endParaRPr lang="de-DE" dirty="0"/>
         </a:p>
       </dgm:t>
     </dgm:pt>
@@ -3341,22 +3328,9 @@
         <a:lstStyle/>
         <a:p>
           <a:r>
-            <a:rPr lang="de-DE" dirty="0"/>
-            <a:t>Set </a:t>
+            <a:rPr lang="en-AU" noProof="0" dirty="0"/>
+            <a:t>Set of weights</a:t>
           </a:r>
-          <a:r>
-            <a:rPr lang="de-DE" dirty="0" err="1"/>
-            <a:t>of</a:t>
-          </a:r>
-          <a:r>
-            <a:rPr lang="de-DE" dirty="0"/>
-            <a:t> </a:t>
-          </a:r>
-          <a:r>
-            <a:rPr lang="de-DE" dirty="0" err="1"/>
-            <a:t>weights</a:t>
-          </a:r>
-          <a:endParaRPr lang="de-DE" dirty="0"/>
         </a:p>
       </dgm:t>
     </dgm:pt>
@@ -3631,11 +3605,11 @@
         <a:lstStyle/>
         <a:p>
           <a:r>
-            <a:rPr lang="de-DE" dirty="0" err="1"/>
+            <a:rPr lang="en-AU" noProof="0" dirty="0"/>
             <a:t>Configuration</a:t>
           </a:r>
           <a:r>
-            <a:rPr lang="de-DE" dirty="0"/>
+            <a:rPr lang="en-AU" dirty="0"/>
             <a:t> 1</a:t>
           </a:r>
         </a:p>
@@ -3667,11 +3641,12 @@
       <dgm:prSet phldrT="[Text]"/>
       <dgm:spPr/>
       <dgm:t>
-        <a:bodyPr/>
+        <a:bodyPr anchor="ctr"/>
         <a:lstStyle/>
         <a:p>
+          <a:pPr algn="l"/>
           <a:r>
-            <a:rPr lang="de-DE" dirty="0"/>
+            <a:rPr lang="en-AU" dirty="0"/>
             <a:t>4 Joints</a:t>
           </a:r>
         </a:p>
@@ -3703,28 +3678,13 @@
       <dgm:prSet phldrT="[Text]"/>
       <dgm:spPr/>
       <dgm:t>
-        <a:bodyPr/>
+        <a:bodyPr anchor="ctr"/>
         <a:lstStyle/>
         <a:p>
+          <a:pPr algn="l"/>
           <a:r>
-            <a:rPr lang="de-DE" dirty="0"/>
-            <a:t>Input: </a:t>
-          </a:r>
-          <a:r>
-            <a:rPr lang="de-DE" dirty="0" err="1"/>
-            <a:t>fixed</a:t>
-          </a:r>
-          <a:r>
-            <a:rPr lang="de-DE" dirty="0"/>
-            <a:t> </a:t>
-          </a:r>
-          <a:r>
-            <a:rPr lang="de-DE" dirty="0" err="1"/>
-            <a:t>value</a:t>
-          </a:r>
-          <a:r>
-            <a:rPr lang="de-DE" dirty="0"/>
-            <a:t> (1)</a:t>
+            <a:rPr lang="en-AU" dirty="0"/>
+            <a:t>Input: fixed value (1)</a:t>
           </a:r>
         </a:p>
       </dgm:t>
@@ -3759,12 +3719,8 @@
         <a:lstStyle/>
         <a:p>
           <a:r>
-            <a:rPr lang="de-DE" dirty="0" err="1"/>
-            <a:t>Configuration</a:t>
-          </a:r>
-          <a:r>
-            <a:rPr lang="de-DE" dirty="0"/>
-            <a:t> 2</a:t>
+            <a:rPr lang="en-AU" dirty="0"/>
+            <a:t>Configuration 2</a:t>
           </a:r>
         </a:p>
       </dgm:t>
@@ -3795,11 +3751,11 @@
       <dgm:prSet phldrT="[Text]"/>
       <dgm:spPr/>
       <dgm:t>
-        <a:bodyPr/>
+        <a:bodyPr anchor="ctr"/>
         <a:lstStyle/>
         <a:p>
           <a:r>
-            <a:rPr lang="de-DE" dirty="0"/>
+            <a:rPr lang="en-AU" dirty="0"/>
             <a:t>7 Joints </a:t>
           </a:r>
         </a:p>
@@ -3831,20 +3787,12 @@
       <dgm:prSet phldrT="[Text]"/>
       <dgm:spPr/>
       <dgm:t>
-        <a:bodyPr/>
+        <a:bodyPr anchor="ctr"/>
         <a:lstStyle/>
         <a:p>
           <a:r>
-            <a:rPr lang="de-DE" dirty="0"/>
-            <a:t>Input: Position </a:t>
-          </a:r>
-          <a:r>
-            <a:rPr lang="de-DE" dirty="0" err="1"/>
-            <a:t>of</a:t>
-          </a:r>
-          <a:r>
-            <a:rPr lang="de-DE" dirty="0"/>
-            <a:t> Box (x, y, z)</a:t>
+            <a:rPr lang="en-AU" dirty="0"/>
+            <a:t>Input: Position of Box (x, y, z)</a:t>
           </a:r>
         </a:p>
       </dgm:t>
@@ -3879,12 +3827,8 @@
         <a:lstStyle/>
         <a:p>
           <a:r>
-            <a:rPr lang="de-DE" dirty="0" err="1"/>
-            <a:t>Configuration</a:t>
-          </a:r>
-          <a:r>
-            <a:rPr lang="de-DE" dirty="0"/>
-            <a:t> 3</a:t>
+            <a:rPr lang="en-AU" dirty="0"/>
+            <a:t>Configuration 3</a:t>
           </a:r>
         </a:p>
       </dgm:t>
@@ -3915,11 +3859,11 @@
       <dgm:prSet phldrT="[Text]"/>
       <dgm:spPr/>
       <dgm:t>
-        <a:bodyPr/>
+        <a:bodyPr anchor="ctr"/>
         <a:lstStyle/>
         <a:p>
           <a:r>
-            <a:rPr lang="de-DE" dirty="0"/>
+            <a:rPr lang="en-AU" dirty="0"/>
             <a:t>7 Joints </a:t>
           </a:r>
         </a:p>
@@ -3951,58 +3895,13 @@
       <dgm:prSet phldrT="[Text]"/>
       <dgm:spPr/>
       <dgm:t>
-        <a:bodyPr/>
+        <a:bodyPr anchor="ctr"/>
         <a:lstStyle/>
         <a:p>
           <a:r>
-            <a:rPr lang="de-DE" dirty="0"/>
-            <a:t>Input: Position </a:t>
+            <a:rPr lang="en-AU" dirty="0"/>
+            <a:t>Input: Position of Box casted to second decimal place</a:t>
           </a:r>
-          <a:r>
-            <a:rPr lang="de-DE" dirty="0" err="1"/>
-            <a:t>of</a:t>
-          </a:r>
-          <a:r>
-            <a:rPr lang="de-DE" dirty="0"/>
-            <a:t> Box </a:t>
-          </a:r>
-          <a:r>
-            <a:rPr lang="de-DE" dirty="0" err="1"/>
-            <a:t>casted</a:t>
-          </a:r>
-          <a:r>
-            <a:rPr lang="de-DE" dirty="0"/>
-            <a:t> </a:t>
-          </a:r>
-          <a:r>
-            <a:rPr lang="de-DE" dirty="0" err="1"/>
-            <a:t>to</a:t>
-          </a:r>
-          <a:r>
-            <a:rPr lang="de-DE" dirty="0"/>
-            <a:t> </a:t>
-          </a:r>
-          <a:r>
-            <a:rPr lang="de-DE" dirty="0" err="1"/>
-            <a:t>second</a:t>
-          </a:r>
-          <a:r>
-            <a:rPr lang="de-DE" dirty="0"/>
-            <a:t> </a:t>
-          </a:r>
-          <a:r>
-            <a:rPr lang="de-DE" dirty="0" err="1"/>
-            <a:t>decimal</a:t>
-          </a:r>
-          <a:r>
-            <a:rPr lang="de-DE" dirty="0"/>
-            <a:t> </a:t>
-          </a:r>
-          <a:r>
-            <a:rPr lang="de-DE" dirty="0" err="1"/>
-            <a:t>place</a:t>
-          </a:r>
-          <a:endParaRPr lang="de-DE" dirty="0"/>
         </a:p>
       </dgm:t>
     </dgm:pt>
@@ -4028,6 +3927,114 @@
         </a:p>
       </dgm:t>
     </dgm:pt>
+    <dgm:pt modelId="{0AE42F78-75DF-4ED2-8665-1D19B7BBBD8B}">
+      <dgm:prSet phldrT="[Text]"/>
+      <dgm:spPr/>
+      <dgm:t>
+        <a:bodyPr anchor="ctr"/>
+        <a:lstStyle/>
+        <a:p>
+          <a:r>
+            <a:rPr lang="en-AU" dirty="0"/>
+            <a:t>Configuration 4</a:t>
+          </a:r>
+        </a:p>
+      </dgm:t>
+    </dgm:pt>
+    <dgm:pt modelId="{08154ED3-5A7A-498A-A807-C74E6E576989}" type="parTrans" cxnId="{C23B582D-E12F-412E-9A45-B3BDB4028B8E}">
+      <dgm:prSet/>
+      <dgm:spPr/>
+      <dgm:t>
+        <a:bodyPr/>
+        <a:lstStyle/>
+        <a:p>
+          <a:endParaRPr lang="de-DE"/>
+        </a:p>
+      </dgm:t>
+    </dgm:pt>
+    <dgm:pt modelId="{FEAEB22B-453B-4E99-8966-B2A8C7176623}" type="sibTrans" cxnId="{C23B582D-E12F-412E-9A45-B3BDB4028B8E}">
+      <dgm:prSet/>
+      <dgm:spPr/>
+      <dgm:t>
+        <a:bodyPr/>
+        <a:lstStyle/>
+        <a:p>
+          <a:endParaRPr lang="de-DE"/>
+        </a:p>
+      </dgm:t>
+    </dgm:pt>
+    <dgm:pt modelId="{844A32FB-4A33-46C6-9FC6-A5F0C4477190}">
+      <dgm:prSet phldrT="[Text]"/>
+      <dgm:spPr/>
+      <dgm:t>
+        <a:bodyPr anchor="ctr"/>
+        <a:lstStyle/>
+        <a:p>
+          <a:r>
+            <a:rPr lang="en-AU" dirty="0"/>
+            <a:t>7 Joints</a:t>
+          </a:r>
+        </a:p>
+      </dgm:t>
+    </dgm:pt>
+    <dgm:pt modelId="{ADCA7059-0589-4340-98CF-858D27879A44}" type="parTrans" cxnId="{7CAD79A4-971F-459F-B3EB-BA452DFCC016}">
+      <dgm:prSet/>
+      <dgm:spPr/>
+      <dgm:t>
+        <a:bodyPr/>
+        <a:lstStyle/>
+        <a:p>
+          <a:endParaRPr lang="de-DE"/>
+        </a:p>
+      </dgm:t>
+    </dgm:pt>
+    <dgm:pt modelId="{1C315F77-0455-46BD-9C8A-6DB92BBC000B}" type="sibTrans" cxnId="{7CAD79A4-971F-459F-B3EB-BA452DFCC016}">
+      <dgm:prSet/>
+      <dgm:spPr/>
+      <dgm:t>
+        <a:bodyPr/>
+        <a:lstStyle/>
+        <a:p>
+          <a:endParaRPr lang="de-DE"/>
+        </a:p>
+      </dgm:t>
+    </dgm:pt>
+    <dgm:pt modelId="{8ECD3F46-D965-4E33-BB5A-054E2B2E08B7}">
+      <dgm:prSet phldrT="[Text]"/>
+      <dgm:spPr/>
+      <dgm:t>
+        <a:bodyPr anchor="ctr"/>
+        <a:lstStyle/>
+        <a:p>
+          <a:r>
+            <a:rPr lang="en-AU" dirty="0"/>
+            <a:t>Scaled output weights </a:t>
+          </a:r>
+        </a:p>
+      </dgm:t>
+    </dgm:pt>
+    <dgm:pt modelId="{43D34C95-0B98-4F71-9B5A-80A88B7F0F54}" type="parTrans" cxnId="{6ED4971D-EBC8-4ACF-A675-850373C86631}">
+      <dgm:prSet/>
+      <dgm:spPr/>
+      <dgm:t>
+        <a:bodyPr/>
+        <a:lstStyle/>
+        <a:p>
+          <a:endParaRPr lang="de-DE"/>
+        </a:p>
+      </dgm:t>
+    </dgm:pt>
+    <dgm:pt modelId="{8AE6F59D-D611-4660-B58C-5ABDBB7E6BF5}" type="sibTrans" cxnId="{6ED4971D-EBC8-4ACF-A675-850373C86631}">
+      <dgm:prSet/>
+      <dgm:spPr/>
+      <dgm:t>
+        <a:bodyPr/>
+        <a:lstStyle/>
+        <a:p>
+          <a:endParaRPr lang="de-DE"/>
+        </a:p>
+      </dgm:t>
+    </dgm:pt>
     <dgm:pt modelId="{FA21F7F4-50B3-45F6-A88F-9B3DE9041CC2}" type="pres">
       <dgm:prSet presAssocID="{0E260D17-6868-4008-AE02-F7F787504DEC}" presName="Name0" presStyleCnt="0">
         <dgm:presLayoutVars>
@@ -4043,7 +4050,7 @@
       <dgm:spPr/>
     </dgm:pt>
     <dgm:pt modelId="{81CC7B86-9A47-44F5-84D6-0AEC5154AF2B}" type="pres">
-      <dgm:prSet presAssocID="{51E2ACC0-0B75-42BD-8810-F63EA73DA2F1}" presName="parentShp" presStyleLbl="node1" presStyleIdx="0" presStyleCnt="3">
+      <dgm:prSet presAssocID="{51E2ACC0-0B75-42BD-8810-F63EA73DA2F1}" presName="parentShp" presStyleLbl="node1" presStyleIdx="0" presStyleCnt="4">
         <dgm:presLayoutVars>
           <dgm:bulletEnabled val="1"/>
         </dgm:presLayoutVars>
@@ -4051,7 +4058,7 @@
       <dgm:spPr/>
     </dgm:pt>
     <dgm:pt modelId="{1FC945EC-7AB0-4085-B10B-2F4298600D00}" type="pres">
-      <dgm:prSet presAssocID="{51E2ACC0-0B75-42BD-8810-F63EA73DA2F1}" presName="childShp" presStyleLbl="bgAccFollowNode1" presStyleIdx="0" presStyleCnt="3">
+      <dgm:prSet presAssocID="{51E2ACC0-0B75-42BD-8810-F63EA73DA2F1}" presName="childShp" presStyleLbl="bgAccFollowNode1" presStyleIdx="0" presStyleCnt="4">
         <dgm:presLayoutVars>
           <dgm:bulletEnabled val="1"/>
         </dgm:presLayoutVars>
@@ -4067,7 +4074,7 @@
       <dgm:spPr/>
     </dgm:pt>
     <dgm:pt modelId="{B852BAED-759F-4C9F-BF10-70A15273D624}" type="pres">
-      <dgm:prSet presAssocID="{DFF4A574-8044-4A93-86C1-A67934EBC243}" presName="parentShp" presStyleLbl="node1" presStyleIdx="1" presStyleCnt="3">
+      <dgm:prSet presAssocID="{DFF4A574-8044-4A93-86C1-A67934EBC243}" presName="parentShp" presStyleLbl="node1" presStyleIdx="1" presStyleCnt="4">
         <dgm:presLayoutVars>
           <dgm:bulletEnabled val="1"/>
         </dgm:presLayoutVars>
@@ -4075,7 +4082,7 @@
       <dgm:spPr/>
     </dgm:pt>
     <dgm:pt modelId="{D8CFF8F9-7F78-4961-8EDB-14508B11E1B8}" type="pres">
-      <dgm:prSet presAssocID="{DFF4A574-8044-4A93-86C1-A67934EBC243}" presName="childShp" presStyleLbl="bgAccFollowNode1" presStyleIdx="1" presStyleCnt="3">
+      <dgm:prSet presAssocID="{DFF4A574-8044-4A93-86C1-A67934EBC243}" presName="childShp" presStyleLbl="bgAccFollowNode1" presStyleIdx="1" presStyleCnt="4">
         <dgm:presLayoutVars>
           <dgm:bulletEnabled val="1"/>
         </dgm:presLayoutVars>
@@ -4091,7 +4098,7 @@
       <dgm:spPr/>
     </dgm:pt>
     <dgm:pt modelId="{A6F5B446-6036-4A98-BEE8-2B87A3C0CC63}" type="pres">
-      <dgm:prSet presAssocID="{3D0F2151-B2D8-41FF-B582-7ED839EAADC2}" presName="parentShp" presStyleLbl="node1" presStyleIdx="2" presStyleCnt="3">
+      <dgm:prSet presAssocID="{3D0F2151-B2D8-41FF-B582-7ED839EAADC2}" presName="parentShp" presStyleLbl="node1" presStyleIdx="2" presStyleCnt="4">
         <dgm:presLayoutVars>
           <dgm:bulletEnabled val="1"/>
         </dgm:presLayoutVars>
@@ -4099,7 +4106,31 @@
       <dgm:spPr/>
     </dgm:pt>
     <dgm:pt modelId="{9400E4C8-7814-41B8-BE7A-C4E18447F184}" type="pres">
-      <dgm:prSet presAssocID="{3D0F2151-B2D8-41FF-B582-7ED839EAADC2}" presName="childShp" presStyleLbl="bgAccFollowNode1" presStyleIdx="2" presStyleCnt="3">
+      <dgm:prSet presAssocID="{3D0F2151-B2D8-41FF-B582-7ED839EAADC2}" presName="childShp" presStyleLbl="bgAccFollowNode1" presStyleIdx="2" presStyleCnt="4">
+        <dgm:presLayoutVars>
+          <dgm:bulletEnabled val="1"/>
+        </dgm:presLayoutVars>
+      </dgm:prSet>
+      <dgm:spPr/>
+    </dgm:pt>
+    <dgm:pt modelId="{90B203AF-46B6-4F22-A6D6-A196E345766E}" type="pres">
+      <dgm:prSet presAssocID="{9EC5E59B-322F-45DC-8E7F-BE1E7EF4AD92}" presName="spacing" presStyleCnt="0"/>
+      <dgm:spPr/>
+    </dgm:pt>
+    <dgm:pt modelId="{9943B32E-AD95-4130-9DDA-B4066C1FFE4B}" type="pres">
+      <dgm:prSet presAssocID="{0AE42F78-75DF-4ED2-8665-1D19B7BBBD8B}" presName="linNode" presStyleCnt="0"/>
+      <dgm:spPr/>
+    </dgm:pt>
+    <dgm:pt modelId="{1D7D7A36-BC4C-4403-9B33-53F75BCF0BA7}" type="pres">
+      <dgm:prSet presAssocID="{0AE42F78-75DF-4ED2-8665-1D19B7BBBD8B}" presName="parentShp" presStyleLbl="node1" presStyleIdx="3" presStyleCnt="4">
+        <dgm:presLayoutVars>
+          <dgm:bulletEnabled val="1"/>
+        </dgm:presLayoutVars>
+      </dgm:prSet>
+      <dgm:spPr/>
+    </dgm:pt>
+    <dgm:pt modelId="{C30E3193-6DCD-4ECE-BB97-685BAF8A8155}" type="pres">
+      <dgm:prSet presAssocID="{0AE42F78-75DF-4ED2-8665-1D19B7BBBD8B}" presName="childShp" presStyleLbl="bgAccFollowNode1" presStyleIdx="3" presStyleCnt="4">
         <dgm:presLayoutVars>
           <dgm:bulletEnabled val="1"/>
         </dgm:presLayoutVars>
@@ -4111,20 +4142,26 @@
     <dgm:cxn modelId="{1BF4AB04-9745-47F9-B8FE-A0C4F17FF880}" type="presOf" srcId="{51E2ACC0-0B75-42BD-8810-F63EA73DA2F1}" destId="{81CC7B86-9A47-44F5-84D6-0AEC5154AF2B}" srcOrd="0" destOrd="0" presId="urn:microsoft.com/office/officeart/2005/8/layout/vList6"/>
     <dgm:cxn modelId="{25176A05-A7BC-474C-ACA0-A934182AFC0E}" srcId="{51E2ACC0-0B75-42BD-8810-F63EA73DA2F1}" destId="{BD7A570A-1892-45A2-8715-FC5C7ED0C9FF}" srcOrd="1" destOrd="0" parTransId="{B21F239D-7B58-4440-8A62-3EFE6414603E}" sibTransId="{55C87914-D275-4161-9CF6-A97EEEC38B9C}"/>
     <dgm:cxn modelId="{4170A117-74BC-489D-944B-CA9835A19D56}" srcId="{0E260D17-6868-4008-AE02-F7F787504DEC}" destId="{DFF4A574-8044-4A93-86C1-A67934EBC243}" srcOrd="1" destOrd="0" parTransId="{FEAC1277-D4DE-43AC-A438-246AD10BD759}" sibTransId="{7E722957-EB53-4C55-9AD6-FA2BDFCA2B8D}"/>
+    <dgm:cxn modelId="{6ED4971D-EBC8-4ACF-A675-850373C86631}" srcId="{0AE42F78-75DF-4ED2-8665-1D19B7BBBD8B}" destId="{8ECD3F46-D965-4E33-BB5A-054E2B2E08B7}" srcOrd="1" destOrd="0" parTransId="{43D34C95-0B98-4F71-9B5A-80A88B7F0F54}" sibTransId="{8AE6F59D-D611-4660-B58C-5ABDBB7E6BF5}"/>
     <dgm:cxn modelId="{05FEA721-F45C-41B6-AD45-B32DA1BF14D0}" type="presOf" srcId="{893F95BF-E904-4D2C-AF0C-316F8705C9AE}" destId="{1FC945EC-7AB0-4085-B10B-2F4298600D00}" srcOrd="0" destOrd="0" presId="urn:microsoft.com/office/officeart/2005/8/layout/vList6"/>
     <dgm:cxn modelId="{2BC77924-8D63-4955-B39F-3EC3B9D74543}" type="presOf" srcId="{BD7A570A-1892-45A2-8715-FC5C7ED0C9FF}" destId="{1FC945EC-7AB0-4085-B10B-2F4298600D00}" srcOrd="0" destOrd="1" presId="urn:microsoft.com/office/officeart/2005/8/layout/vList6"/>
+    <dgm:cxn modelId="{C23B582D-E12F-412E-9A45-B3BDB4028B8E}" srcId="{0E260D17-6868-4008-AE02-F7F787504DEC}" destId="{0AE42F78-75DF-4ED2-8665-1D19B7BBBD8B}" srcOrd="3" destOrd="0" parTransId="{08154ED3-5A7A-498A-A807-C74E6E576989}" sibTransId="{FEAEB22B-453B-4E99-8966-B2A8C7176623}"/>
     <dgm:cxn modelId="{FEC3606F-4C80-4C02-B498-DF1C1081B506}" srcId="{0E260D17-6868-4008-AE02-F7F787504DEC}" destId="{3D0F2151-B2D8-41FF-B582-7ED839EAADC2}" srcOrd="2" destOrd="0" parTransId="{E1F1B0F9-C419-4A4F-ADC4-42BED30764F1}" sibTransId="{9EC5E59B-322F-45DC-8E7F-BE1E7EF4AD92}"/>
+    <dgm:cxn modelId="{9CCEB18E-B9F9-401D-88DA-D292E8D6465E}" type="presOf" srcId="{844A32FB-4A33-46C6-9FC6-A5F0C4477190}" destId="{C30E3193-6DCD-4ECE-BB97-685BAF8A8155}" srcOrd="0" destOrd="0" presId="urn:microsoft.com/office/officeart/2005/8/layout/vList6"/>
     <dgm:cxn modelId="{87A4F995-4E08-4A13-A9C2-EDF026001BB7}" type="presOf" srcId="{3D0F2151-B2D8-41FF-B582-7ED839EAADC2}" destId="{A6F5B446-6036-4A98-BEE8-2B87A3C0CC63}" srcOrd="0" destOrd="0" presId="urn:microsoft.com/office/officeart/2005/8/layout/vList6"/>
     <dgm:cxn modelId="{817E3F96-BA3C-4260-9A6C-84ECCBFAEC7C}" srcId="{51E2ACC0-0B75-42BD-8810-F63EA73DA2F1}" destId="{893F95BF-E904-4D2C-AF0C-316F8705C9AE}" srcOrd="0" destOrd="0" parTransId="{32D32460-11EF-4DFD-A0BF-6EC5BF711C14}" sibTransId="{5E3D0D8A-7979-4C58-8529-27EF924023F0}"/>
     <dgm:cxn modelId="{D24FF89C-561C-4918-AFA0-F1AABEA27D37}" type="presOf" srcId="{3332E5D0-4A06-44F7-81FE-D6BB22710A9E}" destId="{D8CFF8F9-7F78-4961-8EDB-14508B11E1B8}" srcOrd="0" destOrd="1" presId="urn:microsoft.com/office/officeart/2005/8/layout/vList6"/>
     <dgm:cxn modelId="{30CEFBA2-30D9-47BC-92C2-9F9FE46488EF}" type="presOf" srcId="{64FCBCF5-0C1C-4AE3-B2A8-E2AA3EA991EC}" destId="{9400E4C8-7814-41B8-BE7A-C4E18447F184}" srcOrd="0" destOrd="1" presId="urn:microsoft.com/office/officeart/2005/8/layout/vList6"/>
+    <dgm:cxn modelId="{7CAD79A4-971F-459F-B3EB-BA452DFCC016}" srcId="{0AE42F78-75DF-4ED2-8665-1D19B7BBBD8B}" destId="{844A32FB-4A33-46C6-9FC6-A5F0C4477190}" srcOrd="0" destOrd="0" parTransId="{ADCA7059-0589-4340-98CF-858D27879A44}" sibTransId="{1C315F77-0455-46BD-9C8A-6DB92BBC000B}"/>
     <dgm:cxn modelId="{4A8F56B4-6E8E-4171-85D3-46FB8128BC23}" type="presOf" srcId="{0E260D17-6868-4008-AE02-F7F787504DEC}" destId="{FA21F7F4-50B3-45F6-A88F-9B3DE9041CC2}" srcOrd="0" destOrd="0" presId="urn:microsoft.com/office/officeart/2005/8/layout/vList6"/>
+    <dgm:cxn modelId="{0460B6B5-6CB4-4D30-87F8-4E4B362D10AB}" type="presOf" srcId="{8ECD3F46-D965-4E33-BB5A-054E2B2E08B7}" destId="{C30E3193-6DCD-4ECE-BB97-685BAF8A8155}" srcOrd="0" destOrd="1" presId="urn:microsoft.com/office/officeart/2005/8/layout/vList6"/>
     <dgm:cxn modelId="{1C0653C0-0592-40F7-ACE0-566EC9F68437}" srcId="{3D0F2151-B2D8-41FF-B582-7ED839EAADC2}" destId="{64FCBCF5-0C1C-4AE3-B2A8-E2AA3EA991EC}" srcOrd="1" destOrd="0" parTransId="{BC9B7DC6-5E4D-4D71-B68E-738E20EBD9EF}" sibTransId="{734742C1-6C95-4BBE-B5F9-98D4EC7E227E}"/>
     <dgm:cxn modelId="{35A2F8D4-6624-4385-B324-787E01F6DCCC}" type="presOf" srcId="{DFF4A574-8044-4A93-86C1-A67934EBC243}" destId="{B852BAED-759F-4C9F-BF10-70A15273D624}" srcOrd="0" destOrd="0" presId="urn:microsoft.com/office/officeart/2005/8/layout/vList6"/>
     <dgm:cxn modelId="{452444DB-5A44-4174-A754-D303FCDFBBE8}" srcId="{DFF4A574-8044-4A93-86C1-A67934EBC243}" destId="{3332E5D0-4A06-44F7-81FE-D6BB22710A9E}" srcOrd="1" destOrd="0" parTransId="{6EFA6F36-EE5D-4DEE-8098-4F7A63F1AE71}" sibTransId="{56980D41-B387-4AFE-A908-6C6750C0B046}"/>
     <dgm:cxn modelId="{FEE134DE-0457-409B-84C8-0983B6FFD05D}" srcId="{0E260D17-6868-4008-AE02-F7F787504DEC}" destId="{51E2ACC0-0B75-42BD-8810-F63EA73DA2F1}" srcOrd="0" destOrd="0" parTransId="{85349275-09CC-4F80-96BF-D8D2565C6686}" sibTransId="{777256F6-029F-45F5-91F2-5492DD0F90EE}"/>
     <dgm:cxn modelId="{33258CE3-259B-4451-B7CA-D4AF80DA37D7}" type="presOf" srcId="{D5C4A1BA-6BAE-4446-A445-63D3B4B81CE5}" destId="{9400E4C8-7814-41B8-BE7A-C4E18447F184}" srcOrd="0" destOrd="0" presId="urn:microsoft.com/office/officeart/2005/8/layout/vList6"/>
     <dgm:cxn modelId="{B9561FE7-AB00-4EC7-A0B1-17F288455E09}" type="presOf" srcId="{0B752429-EB1A-4A8D-AA05-54BCC50267C7}" destId="{D8CFF8F9-7F78-4961-8EDB-14508B11E1B8}" srcOrd="0" destOrd="0" presId="urn:microsoft.com/office/officeart/2005/8/layout/vList6"/>
+    <dgm:cxn modelId="{4613D9F7-E5D5-46F2-9734-04AF1E12EFFD}" type="presOf" srcId="{0AE42F78-75DF-4ED2-8665-1D19B7BBBD8B}" destId="{1D7D7A36-BC4C-4403-9B33-53F75BCF0BA7}" srcOrd="0" destOrd="0" presId="urn:microsoft.com/office/officeart/2005/8/layout/vList6"/>
     <dgm:cxn modelId="{A248ECF8-8213-40E6-899E-86B9CB18A048}" srcId="{3D0F2151-B2D8-41FF-B582-7ED839EAADC2}" destId="{D5C4A1BA-6BAE-4446-A445-63D3B4B81CE5}" srcOrd="0" destOrd="0" parTransId="{1693751F-E299-4CA8-9C8C-0D997DE8F66E}" sibTransId="{991BF08B-A680-4FFD-96E9-F51E3384F36E}"/>
     <dgm:cxn modelId="{8393EEFA-CD2B-4183-B8F2-14B870B81C91}" srcId="{DFF4A574-8044-4A93-86C1-A67934EBC243}" destId="{0B752429-EB1A-4A8D-AA05-54BCC50267C7}" srcOrd="0" destOrd="0" parTransId="{AF072A7B-4AC1-48D6-A651-9C1122B0F875}" sibTransId="{07703711-F2CC-4CE0-A232-0C2123B7A690}"/>
     <dgm:cxn modelId="{4DE8A365-2D64-4913-8612-BAAAF79ADE2D}" type="presParOf" srcId="{FA21F7F4-50B3-45F6-A88F-9B3DE9041CC2}" destId="{67EE3DF0-D848-413E-B5FE-5E6263C48080}" srcOrd="0" destOrd="0" presId="urn:microsoft.com/office/officeart/2005/8/layout/vList6"/>
@@ -4138,12 +4175,16 @@
     <dgm:cxn modelId="{AFD93AA9-24AA-4E15-92A2-58FCE7F4CD8D}" type="presParOf" srcId="{FA21F7F4-50B3-45F6-A88F-9B3DE9041CC2}" destId="{A49885D6-4227-46B4-8B80-70A45CF11B39}" srcOrd="4" destOrd="0" presId="urn:microsoft.com/office/officeart/2005/8/layout/vList6"/>
     <dgm:cxn modelId="{6085E354-BDB8-4608-B3E4-423FCD477258}" type="presParOf" srcId="{A49885D6-4227-46B4-8B80-70A45CF11B39}" destId="{A6F5B446-6036-4A98-BEE8-2B87A3C0CC63}" srcOrd="0" destOrd="0" presId="urn:microsoft.com/office/officeart/2005/8/layout/vList6"/>
     <dgm:cxn modelId="{C1BE9F1D-C456-4E90-BAD8-6671348002E7}" type="presParOf" srcId="{A49885D6-4227-46B4-8B80-70A45CF11B39}" destId="{9400E4C8-7814-41B8-BE7A-C4E18447F184}" srcOrd="1" destOrd="0" presId="urn:microsoft.com/office/officeart/2005/8/layout/vList6"/>
+    <dgm:cxn modelId="{949836D5-7727-4A02-A2CF-37CA0CEED6BF}" type="presParOf" srcId="{FA21F7F4-50B3-45F6-A88F-9B3DE9041CC2}" destId="{90B203AF-46B6-4F22-A6D6-A196E345766E}" srcOrd="5" destOrd="0" presId="urn:microsoft.com/office/officeart/2005/8/layout/vList6"/>
+    <dgm:cxn modelId="{21B9EE41-1750-4E66-A19E-DF6F5DE9626D}" type="presParOf" srcId="{FA21F7F4-50B3-45F6-A88F-9B3DE9041CC2}" destId="{9943B32E-AD95-4130-9DDA-B4066C1FFE4B}" srcOrd="6" destOrd="0" presId="urn:microsoft.com/office/officeart/2005/8/layout/vList6"/>
+    <dgm:cxn modelId="{DA5D9DE0-5B6A-46D1-95AF-C761392E742F}" type="presParOf" srcId="{9943B32E-AD95-4130-9DDA-B4066C1FFE4B}" destId="{1D7D7A36-BC4C-4403-9B33-53F75BCF0BA7}" srcOrd="0" destOrd="0" presId="urn:microsoft.com/office/officeart/2005/8/layout/vList6"/>
+    <dgm:cxn modelId="{F030A22B-C4D3-4D90-AC49-B8ACA6DC1E85}" type="presParOf" srcId="{9943B32E-AD95-4130-9DDA-B4066C1FFE4B}" destId="{C30E3193-6DCD-4ECE-BB97-685BAF8A8155}" srcOrd="1" destOrd="0" presId="urn:microsoft.com/office/officeart/2005/8/layout/vList6"/>
   </dgm:cxnLst>
   <dgm:bg/>
   <dgm:whole/>
   <dgm:extLst>
     <a:ext uri="http://schemas.microsoft.com/office/drawing/2008/diagram">
-      <dsp:dataModelExt xmlns:dsp="http://schemas.microsoft.com/office/drawing/2008/diagram" relId="rId6" minVer="http://schemas.openxmlformats.org/drawingml/2006/diagram"/>
+      <dsp:dataModelExt xmlns:dsp="http://schemas.microsoft.com/office/drawing/2008/diagram" relId="rId7" minVer="http://schemas.openxmlformats.org/drawingml/2006/diagram"/>
     </a:ext>
   </dgm:extLst>
 </dgm:dataModel>
@@ -4686,7 +4727,7 @@
           </a:pPr>
           <a:r>
             <a:rPr lang="en-AU" sz="1700" kern="1200" noProof="0" dirty="0"/>
-            <a:t>More stable and reproducible </a:t>
+            <a:t>(More stable and reproducible) ???? </a:t>
           </a:r>
         </a:p>
       </dsp:txBody>
@@ -4777,22 +4818,9 @@
             <a:buNone/>
           </a:pPr>
           <a:r>
-            <a:rPr lang="de-DE" sz="3200" kern="1200" dirty="0"/>
-            <a:t>Set </a:t>
+            <a:rPr lang="en-AU" sz="3200" kern="1200" noProof="0" dirty="0"/>
+            <a:t>Set of weights</a:t>
           </a:r>
-          <a:r>
-            <a:rPr lang="de-DE" sz="3200" kern="1200" dirty="0" err="1"/>
-            <a:t>of</a:t>
-          </a:r>
-          <a:r>
-            <a:rPr lang="de-DE" sz="3200" kern="1200" dirty="0"/>
-            <a:t> </a:t>
-          </a:r>
-          <a:r>
-            <a:rPr lang="de-DE" sz="3200" kern="1200" dirty="0" err="1"/>
-            <a:t>weights</a:t>
-          </a:r>
-          <a:endParaRPr lang="de-DE" sz="3200" kern="1200" dirty="0"/>
         </a:p>
       </dsp:txBody>
       <dsp:txXfrm>
@@ -5297,8 +5325,8 @@
       </dsp:nvSpPr>
       <dsp:spPr>
         <a:xfrm>
-          <a:off x="2273531" y="0"/>
-          <a:ext cx="3410297" cy="1545783"/>
+          <a:off x="2516708" y="1401"/>
+          <a:ext cx="3775063" cy="1111752"/>
         </a:xfrm>
         <a:prstGeom prst="rightArrow">
           <a:avLst>
@@ -5345,12 +5373,12 @@
         <a:fontRef idx="minor"/>
       </dsp:style>
       <dsp:txBody>
-        <a:bodyPr spcFirstLastPara="0" vert="horz" wrap="square" lIns="12700" tIns="12700" rIns="12700" bIns="12700" numCol="1" spcCol="1270" anchor="t" anchorCtr="0">
+        <a:bodyPr spcFirstLastPara="0" vert="horz" wrap="square" lIns="12065" tIns="12065" rIns="12065" bIns="12065" numCol="1" spcCol="1270" anchor="ctr" anchorCtr="0">
           <a:noAutofit/>
         </a:bodyPr>
         <a:lstStyle/>
         <a:p>
-          <a:pPr marL="228600" lvl="1" indent="-228600" algn="l" defTabSz="889000">
+          <a:pPr marL="171450" lvl="1" indent="-171450" algn="l" defTabSz="844550">
             <a:lnSpc>
               <a:spcPct val="90000"/>
             </a:lnSpc>
@@ -5363,12 +5391,12 @@
             <a:buChar char="•"/>
           </a:pPr>
           <a:r>
-            <a:rPr lang="de-DE" sz="2000" kern="1200" dirty="0"/>
+            <a:rPr lang="en-AU" sz="1900" kern="1200" dirty="0"/>
             <a:t>4 Joints</a:t>
           </a:r>
         </a:p>
         <a:p>
-          <a:pPr marL="228600" lvl="1" indent="-228600" algn="l" defTabSz="889000">
+          <a:pPr marL="171450" lvl="1" indent="-171450" algn="l" defTabSz="844550">
             <a:lnSpc>
               <a:spcPct val="90000"/>
             </a:lnSpc>
@@ -5381,30 +5409,14 @@
             <a:buChar char="•"/>
           </a:pPr>
           <a:r>
-            <a:rPr lang="de-DE" sz="2000" kern="1200" dirty="0"/>
-            <a:t>Input: </a:t>
-          </a:r>
-          <a:r>
-            <a:rPr lang="de-DE" sz="2000" kern="1200" dirty="0" err="1"/>
-            <a:t>fixed</a:t>
-          </a:r>
-          <a:r>
-            <a:rPr lang="de-DE" sz="2000" kern="1200" dirty="0"/>
-            <a:t> </a:t>
-          </a:r>
-          <a:r>
-            <a:rPr lang="de-DE" sz="2000" kern="1200" dirty="0" err="1"/>
-            <a:t>value</a:t>
-          </a:r>
-          <a:r>
-            <a:rPr lang="de-DE" sz="2000" kern="1200" dirty="0"/>
-            <a:t> (1)</a:t>
+            <a:rPr lang="en-AU" sz="1900" kern="1200" dirty="0"/>
+            <a:t>Input: fixed value (1)</a:t>
           </a:r>
         </a:p>
       </dsp:txBody>
       <dsp:txXfrm>
-        <a:off x="2273531" y="193223"/>
-        <a:ext cx="2830628" cy="1159337"/>
+        <a:off x="2516708" y="140370"/>
+        <a:ext cx="3358156" cy="833814"/>
       </dsp:txXfrm>
     </dsp:sp>
     <dsp:sp modelId="{81CC7B86-9A47-44F5-84D6-0AEC5154AF2B}">
@@ -5414,8 +5426,8 @@
       </dsp:nvSpPr>
       <dsp:spPr>
         <a:xfrm>
-          <a:off x="0" y="0"/>
-          <a:ext cx="2273531" cy="1545783"/>
+          <a:off x="0" y="1401"/>
+          <a:ext cx="2516708" cy="1111752"/>
         </a:xfrm>
         <a:prstGeom prst="roundRect">
           <a:avLst/>
@@ -5457,12 +5469,12 @@
         </a:fontRef>
       </dsp:style>
       <dsp:txBody>
-        <a:bodyPr spcFirstLastPara="0" vert="horz" wrap="square" lIns="91440" tIns="45720" rIns="91440" bIns="45720" numCol="1" spcCol="1270" anchor="ctr" anchorCtr="0">
+        <a:bodyPr spcFirstLastPara="0" vert="horz" wrap="square" lIns="102870" tIns="51435" rIns="102870" bIns="51435" numCol="1" spcCol="1270" anchor="ctr" anchorCtr="0">
           <a:noAutofit/>
         </a:bodyPr>
         <a:lstStyle/>
         <a:p>
-          <a:pPr marL="0" lvl="0" indent="0" algn="ctr" defTabSz="1066800">
+          <a:pPr marL="0" lvl="0" indent="0" algn="ctr" defTabSz="1200150">
             <a:lnSpc>
               <a:spcPct val="90000"/>
             </a:lnSpc>
@@ -5475,18 +5487,18 @@
             <a:buNone/>
           </a:pPr>
           <a:r>
-            <a:rPr lang="de-DE" sz="2400" kern="1200" dirty="0" err="1"/>
+            <a:rPr lang="en-AU" sz="2700" kern="1200" noProof="0" dirty="0"/>
             <a:t>Configuration</a:t>
           </a:r>
           <a:r>
-            <a:rPr lang="de-DE" sz="2400" kern="1200" dirty="0"/>
+            <a:rPr lang="en-AU" sz="2700" kern="1200" dirty="0"/>
             <a:t> 1</a:t>
           </a:r>
         </a:p>
       </dsp:txBody>
       <dsp:txXfrm>
-        <a:off x="75459" y="75459"/>
-        <a:ext cx="2122613" cy="1394865"/>
+        <a:off x="54271" y="55672"/>
+        <a:ext cx="2408166" cy="1003210"/>
       </dsp:txXfrm>
     </dsp:sp>
     <dsp:sp modelId="{D8CFF8F9-7F78-4961-8EDB-14508B11E1B8}">
@@ -5496,8 +5508,8 @@
       </dsp:nvSpPr>
       <dsp:spPr>
         <a:xfrm>
-          <a:off x="2273531" y="1700361"/>
-          <a:ext cx="3410297" cy="1545783"/>
+          <a:off x="2516708" y="1224329"/>
+          <a:ext cx="3775063" cy="1111752"/>
         </a:xfrm>
         <a:prstGeom prst="rightArrow">
           <a:avLst>
@@ -5544,12 +5556,12 @@
         <a:fontRef idx="minor"/>
       </dsp:style>
       <dsp:txBody>
-        <a:bodyPr spcFirstLastPara="0" vert="horz" wrap="square" lIns="12700" tIns="12700" rIns="12700" bIns="12700" numCol="1" spcCol="1270" anchor="t" anchorCtr="0">
+        <a:bodyPr spcFirstLastPara="0" vert="horz" wrap="square" lIns="12065" tIns="12065" rIns="12065" bIns="12065" numCol="1" spcCol="1270" anchor="ctr" anchorCtr="0">
           <a:noAutofit/>
         </a:bodyPr>
         <a:lstStyle/>
         <a:p>
-          <a:pPr marL="228600" lvl="1" indent="-228600" algn="l" defTabSz="889000">
+          <a:pPr marL="171450" lvl="1" indent="-171450" algn="l" defTabSz="844550">
             <a:lnSpc>
               <a:spcPct val="90000"/>
             </a:lnSpc>
@@ -5562,12 +5574,12 @@
             <a:buChar char="•"/>
           </a:pPr>
           <a:r>
-            <a:rPr lang="de-DE" sz="2000" kern="1200" dirty="0"/>
+            <a:rPr lang="en-AU" sz="1900" kern="1200" dirty="0"/>
             <a:t>7 Joints </a:t>
           </a:r>
         </a:p>
         <a:p>
-          <a:pPr marL="228600" lvl="1" indent="-228600" algn="l" defTabSz="889000">
+          <a:pPr marL="171450" lvl="1" indent="-171450" algn="l" defTabSz="844550">
             <a:lnSpc>
               <a:spcPct val="90000"/>
             </a:lnSpc>
@@ -5580,22 +5592,14 @@
             <a:buChar char="•"/>
           </a:pPr>
           <a:r>
-            <a:rPr lang="de-DE" sz="2000" kern="1200" dirty="0"/>
-            <a:t>Input: Position </a:t>
-          </a:r>
-          <a:r>
-            <a:rPr lang="de-DE" sz="2000" kern="1200" dirty="0" err="1"/>
-            <a:t>of</a:t>
-          </a:r>
-          <a:r>
-            <a:rPr lang="de-DE" sz="2000" kern="1200" dirty="0"/>
-            <a:t> Box (x, y, z)</a:t>
+            <a:rPr lang="en-AU" sz="1900" kern="1200" dirty="0"/>
+            <a:t>Input: Position of Box (x, y, z)</a:t>
           </a:r>
         </a:p>
       </dsp:txBody>
       <dsp:txXfrm>
-        <a:off x="2273531" y="1893584"/>
-        <a:ext cx="2830628" cy="1159337"/>
+        <a:off x="2516708" y="1363298"/>
+        <a:ext cx="3358156" cy="833814"/>
       </dsp:txXfrm>
     </dsp:sp>
     <dsp:sp modelId="{B852BAED-759F-4C9F-BF10-70A15273D624}">
@@ -5605,8 +5609,8 @@
       </dsp:nvSpPr>
       <dsp:spPr>
         <a:xfrm>
-          <a:off x="0" y="1700361"/>
-          <a:ext cx="2273531" cy="1545783"/>
+          <a:off x="0" y="1224329"/>
+          <a:ext cx="2516708" cy="1111752"/>
         </a:xfrm>
         <a:prstGeom prst="roundRect">
           <a:avLst/>
@@ -5648,12 +5652,12 @@
         </a:fontRef>
       </dsp:style>
       <dsp:txBody>
-        <a:bodyPr spcFirstLastPara="0" vert="horz" wrap="square" lIns="91440" tIns="45720" rIns="91440" bIns="45720" numCol="1" spcCol="1270" anchor="ctr" anchorCtr="0">
+        <a:bodyPr spcFirstLastPara="0" vert="horz" wrap="square" lIns="102870" tIns="51435" rIns="102870" bIns="51435" numCol="1" spcCol="1270" anchor="ctr" anchorCtr="0">
           <a:noAutofit/>
         </a:bodyPr>
         <a:lstStyle/>
         <a:p>
-          <a:pPr marL="0" lvl="0" indent="0" algn="ctr" defTabSz="1066800">
+          <a:pPr marL="0" lvl="0" indent="0" algn="ctr" defTabSz="1200150">
             <a:lnSpc>
               <a:spcPct val="90000"/>
             </a:lnSpc>
@@ -5666,18 +5670,14 @@
             <a:buNone/>
           </a:pPr>
           <a:r>
-            <a:rPr lang="de-DE" sz="2400" kern="1200" dirty="0" err="1"/>
-            <a:t>Configuration</a:t>
-          </a:r>
-          <a:r>
-            <a:rPr lang="de-DE" sz="2400" kern="1200" dirty="0"/>
-            <a:t> 2</a:t>
+            <a:rPr lang="en-AU" sz="2700" kern="1200" dirty="0"/>
+            <a:t>Configuration 2</a:t>
           </a:r>
         </a:p>
       </dsp:txBody>
       <dsp:txXfrm>
-        <a:off x="75459" y="1775820"/>
-        <a:ext cx="2122613" cy="1394865"/>
+        <a:off x="54271" y="1278600"/>
+        <a:ext cx="2408166" cy="1003210"/>
       </dsp:txXfrm>
     </dsp:sp>
     <dsp:sp modelId="{9400E4C8-7814-41B8-BE7A-C4E18447F184}">
@@ -5687,8 +5687,8 @@
       </dsp:nvSpPr>
       <dsp:spPr>
         <a:xfrm>
-          <a:off x="2273531" y="3400723"/>
-          <a:ext cx="3410297" cy="1545783"/>
+          <a:off x="2516708" y="2447257"/>
+          <a:ext cx="3775063" cy="1111752"/>
         </a:xfrm>
         <a:prstGeom prst="rightArrow">
           <a:avLst>
@@ -5735,12 +5735,12 @@
         <a:fontRef idx="minor"/>
       </dsp:style>
       <dsp:txBody>
-        <a:bodyPr spcFirstLastPara="0" vert="horz" wrap="square" lIns="12700" tIns="12700" rIns="12700" bIns="12700" numCol="1" spcCol="1270" anchor="t" anchorCtr="0">
+        <a:bodyPr spcFirstLastPara="0" vert="horz" wrap="square" lIns="12065" tIns="12065" rIns="12065" bIns="12065" numCol="1" spcCol="1270" anchor="ctr" anchorCtr="0">
           <a:noAutofit/>
         </a:bodyPr>
         <a:lstStyle/>
         <a:p>
-          <a:pPr marL="228600" lvl="1" indent="-228600" algn="l" defTabSz="889000">
+          <a:pPr marL="171450" lvl="1" indent="-171450" algn="l" defTabSz="844550">
             <a:lnSpc>
               <a:spcPct val="90000"/>
             </a:lnSpc>
@@ -5753,12 +5753,12 @@
             <a:buChar char="•"/>
           </a:pPr>
           <a:r>
-            <a:rPr lang="de-DE" sz="2000" kern="1200" dirty="0"/>
+            <a:rPr lang="en-AU" sz="1900" kern="1200" dirty="0"/>
             <a:t>7 Joints </a:t>
           </a:r>
         </a:p>
         <a:p>
-          <a:pPr marL="228600" lvl="1" indent="-228600" algn="l" defTabSz="889000">
+          <a:pPr marL="171450" lvl="1" indent="-171450" algn="l" defTabSz="844550">
             <a:lnSpc>
               <a:spcPct val="90000"/>
             </a:lnSpc>
@@ -5771,59 +5771,14 @@
             <a:buChar char="•"/>
           </a:pPr>
           <a:r>
-            <a:rPr lang="de-DE" sz="2000" kern="1200" dirty="0"/>
-            <a:t>Input: Position </a:t>
+            <a:rPr lang="en-AU" sz="1900" kern="1200" dirty="0"/>
+            <a:t>Input: Position of Box casted to second decimal place</a:t>
           </a:r>
-          <a:r>
-            <a:rPr lang="de-DE" sz="2000" kern="1200" dirty="0" err="1"/>
-            <a:t>of</a:t>
-          </a:r>
-          <a:r>
-            <a:rPr lang="de-DE" sz="2000" kern="1200" dirty="0"/>
-            <a:t> Box </a:t>
-          </a:r>
-          <a:r>
-            <a:rPr lang="de-DE" sz="2000" kern="1200" dirty="0" err="1"/>
-            <a:t>casted</a:t>
-          </a:r>
-          <a:r>
-            <a:rPr lang="de-DE" sz="2000" kern="1200" dirty="0"/>
-            <a:t> </a:t>
-          </a:r>
-          <a:r>
-            <a:rPr lang="de-DE" sz="2000" kern="1200" dirty="0" err="1"/>
-            <a:t>to</a:t>
-          </a:r>
-          <a:r>
-            <a:rPr lang="de-DE" sz="2000" kern="1200" dirty="0"/>
-            <a:t> </a:t>
-          </a:r>
-          <a:r>
-            <a:rPr lang="de-DE" sz="2000" kern="1200" dirty="0" err="1"/>
-            <a:t>second</a:t>
-          </a:r>
-          <a:r>
-            <a:rPr lang="de-DE" sz="2000" kern="1200" dirty="0"/>
-            <a:t> </a:t>
-          </a:r>
-          <a:r>
-            <a:rPr lang="de-DE" sz="2000" kern="1200" dirty="0" err="1"/>
-            <a:t>decimal</a:t>
-          </a:r>
-          <a:r>
-            <a:rPr lang="de-DE" sz="2000" kern="1200" dirty="0"/>
-            <a:t> </a:t>
-          </a:r>
-          <a:r>
-            <a:rPr lang="de-DE" sz="2000" kern="1200" dirty="0" err="1"/>
-            <a:t>place</a:t>
-          </a:r>
-          <a:endParaRPr lang="de-DE" sz="2000" kern="1200" dirty="0"/>
         </a:p>
       </dsp:txBody>
       <dsp:txXfrm>
-        <a:off x="2273531" y="3593946"/>
-        <a:ext cx="2830628" cy="1159337"/>
+        <a:off x="2516708" y="2586226"/>
+        <a:ext cx="3358156" cy="833814"/>
       </dsp:txXfrm>
     </dsp:sp>
     <dsp:sp modelId="{A6F5B446-6036-4A98-BEE8-2B87A3C0CC63}">
@@ -5833,8 +5788,8 @@
       </dsp:nvSpPr>
       <dsp:spPr>
         <a:xfrm>
-          <a:off x="0" y="3400723"/>
-          <a:ext cx="2273531" cy="1545783"/>
+          <a:off x="0" y="2447257"/>
+          <a:ext cx="2516708" cy="1111752"/>
         </a:xfrm>
         <a:prstGeom prst="roundRect">
           <a:avLst/>
@@ -5876,12 +5831,12 @@
         </a:fontRef>
       </dsp:style>
       <dsp:txBody>
-        <a:bodyPr spcFirstLastPara="0" vert="horz" wrap="square" lIns="91440" tIns="45720" rIns="91440" bIns="45720" numCol="1" spcCol="1270" anchor="ctr" anchorCtr="0">
+        <a:bodyPr spcFirstLastPara="0" vert="horz" wrap="square" lIns="102870" tIns="51435" rIns="102870" bIns="51435" numCol="1" spcCol="1270" anchor="ctr" anchorCtr="0">
           <a:noAutofit/>
         </a:bodyPr>
         <a:lstStyle/>
         <a:p>
-          <a:pPr marL="0" lvl="0" indent="0" algn="ctr" defTabSz="1066800">
+          <a:pPr marL="0" lvl="0" indent="0" algn="ctr" defTabSz="1200150">
             <a:lnSpc>
               <a:spcPct val="90000"/>
             </a:lnSpc>
@@ -5894,18 +5849,193 @@
             <a:buNone/>
           </a:pPr>
           <a:r>
-            <a:rPr lang="de-DE" sz="2400" kern="1200" dirty="0" err="1"/>
-            <a:t>Configuration</a:t>
-          </a:r>
-          <a:r>
-            <a:rPr lang="de-DE" sz="2400" kern="1200" dirty="0"/>
-            <a:t> 3</a:t>
+            <a:rPr lang="en-AU" sz="2700" kern="1200" dirty="0"/>
+            <a:t>Configuration 3</a:t>
           </a:r>
         </a:p>
       </dsp:txBody>
       <dsp:txXfrm>
-        <a:off x="75459" y="3476182"/>
-        <a:ext cx="2122613" cy="1394865"/>
+        <a:off x="54271" y="2501528"/>
+        <a:ext cx="2408166" cy="1003210"/>
+      </dsp:txXfrm>
+    </dsp:sp>
+    <dsp:sp modelId="{C30E3193-6DCD-4ECE-BB97-685BAF8A8155}">
+      <dsp:nvSpPr>
+        <dsp:cNvPr id="0" name=""/>
+        <dsp:cNvSpPr/>
+      </dsp:nvSpPr>
+      <dsp:spPr>
+        <a:xfrm>
+          <a:off x="2516708" y="3670185"/>
+          <a:ext cx="3775063" cy="1111752"/>
+        </a:xfrm>
+        <a:prstGeom prst="rightArrow">
+          <a:avLst>
+            <a:gd name="adj1" fmla="val 75000"/>
+            <a:gd name="adj2" fmla="val 50000"/>
+          </a:avLst>
+        </a:prstGeom>
+        <a:solidFill>
+          <a:schemeClr val="accent1">
+            <a:alpha val="90000"/>
+            <a:tint val="40000"/>
+            <a:hueOff val="0"/>
+            <a:satOff val="0"/>
+            <a:lumOff val="0"/>
+            <a:alphaOff val="0"/>
+          </a:schemeClr>
+        </a:solidFill>
+        <a:ln w="12700" cap="flat" cmpd="sng" algn="ctr">
+          <a:solidFill>
+            <a:schemeClr val="accent1">
+              <a:alpha val="90000"/>
+              <a:tint val="40000"/>
+              <a:hueOff val="0"/>
+              <a:satOff val="0"/>
+              <a:lumOff val="0"/>
+              <a:alphaOff val="0"/>
+            </a:schemeClr>
+          </a:solidFill>
+          <a:prstDash val="solid"/>
+          <a:miter lim="800000"/>
+        </a:ln>
+        <a:effectLst/>
+      </dsp:spPr>
+      <dsp:style>
+        <a:lnRef idx="2">
+          <a:scrgbClr r="0" g="0" b="0"/>
+        </a:lnRef>
+        <a:fillRef idx="1">
+          <a:scrgbClr r="0" g="0" b="0"/>
+        </a:fillRef>
+        <a:effectRef idx="0">
+          <a:scrgbClr r="0" g="0" b="0"/>
+        </a:effectRef>
+        <a:fontRef idx="minor"/>
+      </dsp:style>
+      <dsp:txBody>
+        <a:bodyPr spcFirstLastPara="0" vert="horz" wrap="square" lIns="12065" tIns="12065" rIns="12065" bIns="12065" numCol="1" spcCol="1270" anchor="ctr" anchorCtr="0">
+          <a:noAutofit/>
+        </a:bodyPr>
+        <a:lstStyle/>
+        <a:p>
+          <a:pPr marL="171450" lvl="1" indent="-171450" algn="l" defTabSz="844550">
+            <a:lnSpc>
+              <a:spcPct val="90000"/>
+            </a:lnSpc>
+            <a:spcBef>
+              <a:spcPct val="0"/>
+            </a:spcBef>
+            <a:spcAft>
+              <a:spcPct val="15000"/>
+            </a:spcAft>
+            <a:buChar char="•"/>
+          </a:pPr>
+          <a:r>
+            <a:rPr lang="en-AU" sz="1900" kern="1200" dirty="0"/>
+            <a:t>7 Joints</a:t>
+          </a:r>
+        </a:p>
+        <a:p>
+          <a:pPr marL="171450" lvl="1" indent="-171450" algn="l" defTabSz="844550">
+            <a:lnSpc>
+              <a:spcPct val="90000"/>
+            </a:lnSpc>
+            <a:spcBef>
+              <a:spcPct val="0"/>
+            </a:spcBef>
+            <a:spcAft>
+              <a:spcPct val="15000"/>
+            </a:spcAft>
+            <a:buChar char="•"/>
+          </a:pPr>
+          <a:r>
+            <a:rPr lang="en-AU" sz="1900" kern="1200" dirty="0"/>
+            <a:t>Scaled output weights </a:t>
+          </a:r>
+        </a:p>
+      </dsp:txBody>
+      <dsp:txXfrm>
+        <a:off x="2516708" y="3809154"/>
+        <a:ext cx="3358156" cy="833814"/>
+      </dsp:txXfrm>
+    </dsp:sp>
+    <dsp:sp modelId="{1D7D7A36-BC4C-4403-9B33-53F75BCF0BA7}">
+      <dsp:nvSpPr>
+        <dsp:cNvPr id="0" name=""/>
+        <dsp:cNvSpPr/>
+      </dsp:nvSpPr>
+      <dsp:spPr>
+        <a:xfrm>
+          <a:off x="0" y="3670185"/>
+          <a:ext cx="2516708" cy="1111752"/>
+        </a:xfrm>
+        <a:prstGeom prst="roundRect">
+          <a:avLst/>
+        </a:prstGeom>
+        <a:solidFill>
+          <a:schemeClr val="accent1">
+            <a:hueOff val="0"/>
+            <a:satOff val="0"/>
+            <a:lumOff val="0"/>
+            <a:alphaOff val="0"/>
+          </a:schemeClr>
+        </a:solidFill>
+        <a:ln w="12700" cap="flat" cmpd="sng" algn="ctr">
+          <a:solidFill>
+            <a:schemeClr val="lt1">
+              <a:hueOff val="0"/>
+              <a:satOff val="0"/>
+              <a:lumOff val="0"/>
+              <a:alphaOff val="0"/>
+            </a:schemeClr>
+          </a:solidFill>
+          <a:prstDash val="solid"/>
+          <a:miter lim="800000"/>
+        </a:ln>
+        <a:effectLst/>
+      </dsp:spPr>
+      <dsp:style>
+        <a:lnRef idx="2">
+          <a:scrgbClr r="0" g="0" b="0"/>
+        </a:lnRef>
+        <a:fillRef idx="1">
+          <a:scrgbClr r="0" g="0" b="0"/>
+        </a:fillRef>
+        <a:effectRef idx="0">
+          <a:scrgbClr r="0" g="0" b="0"/>
+        </a:effectRef>
+        <a:fontRef idx="minor">
+          <a:schemeClr val="lt1"/>
+        </a:fontRef>
+      </dsp:style>
+      <dsp:txBody>
+        <a:bodyPr spcFirstLastPara="0" vert="horz" wrap="square" lIns="102870" tIns="51435" rIns="102870" bIns="51435" numCol="1" spcCol="1270" anchor="ctr" anchorCtr="0">
+          <a:noAutofit/>
+        </a:bodyPr>
+        <a:lstStyle/>
+        <a:p>
+          <a:pPr marL="0" lvl="0" indent="0" algn="ctr" defTabSz="1200150">
+            <a:lnSpc>
+              <a:spcPct val="90000"/>
+            </a:lnSpc>
+            <a:spcBef>
+              <a:spcPct val="0"/>
+            </a:spcBef>
+            <a:spcAft>
+              <a:spcPct val="35000"/>
+            </a:spcAft>
+            <a:buNone/>
+          </a:pPr>
+          <a:r>
+            <a:rPr lang="en-AU" sz="2700" kern="1200" dirty="0"/>
+            <a:t>Configuration 4</a:t>
+          </a:r>
+        </a:p>
+      </dsp:txBody>
+      <dsp:txXfrm>
+        <a:off x="54271" y="3724456"/>
+        <a:ext cx="2408166" cy="1003210"/>
       </dsp:txXfrm>
     </dsp:sp>
   </dsp:spTree>
@@ -10320,7 +10450,7 @@
           <a:p>
             <a:fld id="{E13F729A-0AF0-4995-B32B-9504BC68960C}" type="slidenum">
               <a:rPr lang="de-DE" smtClean="0"/>
-              <a:t>4</a:t>
+              <a:t>3</a:t>
             </a:fld>
             <a:endParaRPr lang="de-DE"/>
           </a:p>
@@ -10383,7 +10513,7 @@
           <a:bodyPr/>
           <a:lstStyle/>
           <a:p>
-            <a:endParaRPr lang="de-DE" dirty="0"/>
+            <a:endParaRPr lang="en-US" dirty="0"/>
           </a:p>
         </p:txBody>
       </p:sp>
@@ -10404,7 +10534,7 @@
           <a:p>
             <a:fld id="{E13F729A-0AF0-4995-B32B-9504BC68960C}" type="slidenum">
               <a:rPr lang="de-DE" smtClean="0"/>
-              <a:t>7</a:t>
+              <a:t>4</a:t>
             </a:fld>
             <a:endParaRPr lang="de-DE"/>
           </a:p>
@@ -10413,7 +10543,7 @@
     </p:spTree>
     <p:extLst>
       <p:ext uri="{BB962C8B-B14F-4D97-AF65-F5344CB8AC3E}">
-        <p14:creationId xmlns:p14="http://schemas.microsoft.com/office/powerpoint/2010/main" val="2493535029"/>
+        <p14:creationId xmlns:p14="http://schemas.microsoft.com/office/powerpoint/2010/main" val="1922589798"/>
       </p:ext>
     </p:extLst>
   </p:cSld>
@@ -10488,7 +10618,91 @@
           <a:p>
             <a:fld id="{E13F729A-0AF0-4995-B32B-9504BC68960C}" type="slidenum">
               <a:rPr lang="de-DE" smtClean="0"/>
-              <a:t>8</a:t>
+              <a:t>6</a:t>
+            </a:fld>
+            <a:endParaRPr lang="de-DE"/>
+          </a:p>
+        </p:txBody>
+      </p:sp>
+    </p:spTree>
+    <p:extLst>
+      <p:ext uri="{BB962C8B-B14F-4D97-AF65-F5344CB8AC3E}">
+        <p14:creationId xmlns:p14="http://schemas.microsoft.com/office/powerpoint/2010/main" val="2493535029"/>
+      </p:ext>
+    </p:extLst>
+  </p:cSld>
+  <p:clrMapOvr>
+    <a:masterClrMapping/>
+  </p:clrMapOvr>
+</p:notes>
+</file>
+
+<file path=ppt/notesSlides/notesSlide6.xml><?xml version="1.0" encoding="utf-8"?>
+<p:notes xmlns:a="http://schemas.openxmlformats.org/drawingml/2006/main" xmlns:r="http://schemas.openxmlformats.org/officeDocument/2006/relationships" xmlns:p="http://schemas.openxmlformats.org/presentationml/2006/main">
+  <p:cSld>
+    <p:spTree>
+      <p:nvGrpSpPr>
+        <p:cNvPr id="1" name=""/>
+        <p:cNvGrpSpPr/>
+        <p:nvPr/>
+      </p:nvGrpSpPr>
+      <p:grpSpPr>
+        <a:xfrm>
+          <a:off x="0" y="0"/>
+          <a:ext cx="0" cy="0"/>
+          <a:chOff x="0" y="0"/>
+          <a:chExt cx="0" cy="0"/>
+        </a:xfrm>
+      </p:grpSpPr>
+      <p:sp>
+        <p:nvSpPr>
+          <p:cNvPr id="2" name="Folienbildplatzhalter 1"/>
+          <p:cNvSpPr>
+            <a:spLocks noGrp="1" noRot="1" noChangeAspect="1"/>
+          </p:cNvSpPr>
+          <p:nvPr>
+            <p:ph type="sldImg"/>
+          </p:nvPr>
+        </p:nvSpPr>
+        <p:spPr/>
+      </p:sp>
+      <p:sp>
+        <p:nvSpPr>
+          <p:cNvPr id="3" name="Notizenplatzhalter 2"/>
+          <p:cNvSpPr>
+            <a:spLocks noGrp="1"/>
+          </p:cNvSpPr>
+          <p:nvPr>
+            <p:ph type="body" idx="1"/>
+          </p:nvPr>
+        </p:nvSpPr>
+        <p:spPr/>
+        <p:txBody>
+          <a:bodyPr/>
+          <a:lstStyle/>
+          <a:p>
+            <a:endParaRPr lang="de-DE" dirty="0"/>
+          </a:p>
+        </p:txBody>
+      </p:sp>
+      <p:sp>
+        <p:nvSpPr>
+          <p:cNvPr id="4" name="Foliennummernplatzhalter 3"/>
+          <p:cNvSpPr>
+            <a:spLocks noGrp="1"/>
+          </p:cNvSpPr>
+          <p:nvPr>
+            <p:ph type="sldNum" sz="quarter" idx="5"/>
+          </p:nvPr>
+        </p:nvSpPr>
+        <p:spPr/>
+        <p:txBody>
+          <a:bodyPr/>
+          <a:lstStyle/>
+          <a:p>
+            <a:fld id="{E13F729A-0AF0-4995-B32B-9504BC68960C}" type="slidenum">
+              <a:rPr lang="de-DE" smtClean="0"/>
+              <a:t>7</a:t>
             </a:fld>
             <a:endParaRPr lang="de-DE"/>
           </a:p>
@@ -10507,7 +10721,7 @@
 </p:notes>
 </file>
 
-<file path=ppt/notesSlides/notesSlide6.xml><?xml version="1.0" encoding="utf-8"?>
+<file path=ppt/notesSlides/notesSlide7.xml><?xml version="1.0" encoding="utf-8"?>
 <p:notes xmlns:a="http://schemas.openxmlformats.org/drawingml/2006/main" xmlns:r="http://schemas.openxmlformats.org/officeDocument/2006/relationships" xmlns:p="http://schemas.openxmlformats.org/presentationml/2006/main">
   <p:cSld>
     <p:spTree>
@@ -14156,7 +14370,7 @@
                   <a:srgbClr val="000000"/>
                 </a:solidFill>
               </a:rPr>
-              <a:t>Sebastian „Captain“  …, Tobias Kalb, Yannick Schrempp</a:t>
+              <a:t>Sebastian „Captain“ Rebmann, Tobias Kalb, Yannick Schrempp</a:t>
             </a:r>
           </a:p>
         </p:txBody>
@@ -14265,6 +14479,9 @@
             </a:r>
           </a:p>
           <a:p>
+            <a:pPr marL="0" indent="0">
+              <a:buNone/>
+            </a:pPr>
             <a:endParaRPr lang="en-GB" noProof="0" dirty="0"/>
           </a:p>
         </p:txBody>
@@ -15185,147 +15402,6 @@
           <p:cNvPr id="2" name="Titel 1">
             <a:extLst>
               <a:ext uri="{FF2B5EF4-FFF2-40B4-BE49-F238E27FC236}">
-                <a16:creationId xmlns:a16="http://schemas.microsoft.com/office/drawing/2014/main" id="{2A780950-639F-414C-9E9C-2E53353CB6D4}"/>
-              </a:ext>
-            </a:extLst>
-          </p:cNvPr>
-          <p:cNvSpPr>
-            <a:spLocks noGrp="1"/>
-          </p:cNvSpPr>
-          <p:nvPr>
-            <p:ph type="title"/>
-          </p:nvPr>
-        </p:nvSpPr>
-        <p:spPr/>
-        <p:txBody>
-          <a:bodyPr/>
-          <a:lstStyle/>
-          <a:p>
-            <a:r>
-              <a:rPr lang="en-GB" noProof="0" dirty="0"/>
-              <a:t>Task </a:t>
-            </a:r>
-          </a:p>
-        </p:txBody>
-      </p:sp>
-      <p:sp>
-        <p:nvSpPr>
-          <p:cNvPr id="3" name="Inhaltsplatzhalter 2">
-            <a:extLst>
-              <a:ext uri="{FF2B5EF4-FFF2-40B4-BE49-F238E27FC236}">
-                <a16:creationId xmlns:a16="http://schemas.microsoft.com/office/drawing/2014/main" id="{DA3D1A8F-C408-4734-9FFF-64566676E3EA}"/>
-              </a:ext>
-            </a:extLst>
-          </p:cNvPr>
-          <p:cNvSpPr>
-            <a:spLocks noGrp="1"/>
-          </p:cNvSpPr>
-          <p:nvPr>
-            <p:ph idx="1"/>
-          </p:nvPr>
-        </p:nvSpPr>
-        <p:spPr/>
-        <p:txBody>
-          <a:bodyPr/>
-          <a:lstStyle/>
-          <a:p>
-            <a:endParaRPr lang="en-GB" dirty="0"/>
-          </a:p>
-        </p:txBody>
-      </p:sp>
-      <p:sp>
-        <p:nvSpPr>
-          <p:cNvPr id="4" name="Datumsplatzhalter 3">
-            <a:extLst>
-              <a:ext uri="{FF2B5EF4-FFF2-40B4-BE49-F238E27FC236}">
-                <a16:creationId xmlns:a16="http://schemas.microsoft.com/office/drawing/2014/main" id="{67357B01-B28E-4F6E-A1CE-41579EAEBEB9}"/>
-              </a:ext>
-            </a:extLst>
-          </p:cNvPr>
-          <p:cNvSpPr>
-            <a:spLocks noGrp="1"/>
-          </p:cNvSpPr>
-          <p:nvPr>
-            <p:ph type="dt" sz="half" idx="10"/>
-          </p:nvPr>
-        </p:nvSpPr>
-        <p:spPr/>
-        <p:txBody>
-          <a:bodyPr/>
-          <a:lstStyle/>
-          <a:p>
-            <a:fld id="{801FBE94-C069-4C95-AA74-CDBC26339DEF}" type="datetime1">
-              <a:rPr lang="de-DE" smtClean="0"/>
-              <a:t>12.02.2019</a:t>
-            </a:fld>
-            <a:endParaRPr lang="de-DE" dirty="0"/>
-          </a:p>
-        </p:txBody>
-      </p:sp>
-      <p:sp>
-        <p:nvSpPr>
-          <p:cNvPr id="5" name="Foliennummernplatzhalter 4">
-            <a:extLst>
-              <a:ext uri="{FF2B5EF4-FFF2-40B4-BE49-F238E27FC236}">
-                <a16:creationId xmlns:a16="http://schemas.microsoft.com/office/drawing/2014/main" id="{68E7C7C8-4487-4772-9803-345A61B00C81}"/>
-              </a:ext>
-            </a:extLst>
-          </p:cNvPr>
-          <p:cNvSpPr>
-            <a:spLocks noGrp="1"/>
-          </p:cNvSpPr>
-          <p:nvPr>
-            <p:ph type="sldNum" sz="quarter" idx="12"/>
-          </p:nvPr>
-        </p:nvSpPr>
-        <p:spPr/>
-        <p:txBody>
-          <a:bodyPr/>
-          <a:lstStyle/>
-          <a:p>
-            <a:fld id="{61696EC4-B4CF-4701-AD06-A8439D6D8E12}" type="slidenum">
-              <a:rPr lang="de-DE" smtClean="0"/>
-              <a:t>3</a:t>
-            </a:fld>
-            <a:endParaRPr lang="de-DE"/>
-          </a:p>
-        </p:txBody>
-      </p:sp>
-    </p:spTree>
-    <p:extLst>
-      <p:ext uri="{BB962C8B-B14F-4D97-AF65-F5344CB8AC3E}">
-        <p14:creationId xmlns:p14="http://schemas.microsoft.com/office/powerpoint/2010/main" val="59878369"/>
-      </p:ext>
-    </p:extLst>
-  </p:cSld>
-  <p:clrMapOvr>
-    <a:masterClrMapping/>
-  </p:clrMapOvr>
-</p:sld>
-</file>
-
-<file path=ppt/slides/slide4.xml><?xml version="1.0" encoding="utf-8"?>
-<p:sld xmlns:a="http://schemas.openxmlformats.org/drawingml/2006/main" xmlns:r="http://schemas.openxmlformats.org/officeDocument/2006/relationships" xmlns:p="http://schemas.openxmlformats.org/presentationml/2006/main">
-  <p:cSld>
-    <p:spTree>
-      <p:nvGrpSpPr>
-        <p:cNvPr id="1" name=""/>
-        <p:cNvGrpSpPr/>
-        <p:nvPr/>
-      </p:nvGrpSpPr>
-      <p:grpSpPr>
-        <a:xfrm>
-          <a:off x="0" y="0"/>
-          <a:ext cx="0" cy="0"/>
-          <a:chOff x="0" y="0"/>
-          <a:chExt cx="0" cy="0"/>
-        </a:xfrm>
-      </p:grpSpPr>
-      <p:sp>
-        <p:nvSpPr>
-          <p:cNvPr id="2" name="Titel 1">
-            <a:extLst>
-              <a:ext uri="{FF2B5EF4-FFF2-40B4-BE49-F238E27FC236}">
                 <a16:creationId xmlns:a16="http://schemas.microsoft.com/office/drawing/2014/main" id="{A1C4CA4B-CD43-449A-8972-BEF3CB6E187D}"/>
               </a:ext>
             </a:extLst>
@@ -15401,7 +15477,7 @@
           <a:p>
             <a:fld id="{61696EC4-B4CF-4701-AD06-A8439D6D8E12}" type="slidenum">
               <a:rPr lang="en-AU" smtClean="0"/>
-              <a:t>4</a:t>
+              <a:t>3</a:t>
             </a:fld>
             <a:endParaRPr lang="en-AU" dirty="0"/>
           </a:p>
@@ -15449,7 +15525,7 @@
           <p:nvPr>
             <p:extLst>
               <p:ext uri="{D42A27DB-BD31-4B8C-83A1-F6EECF244321}">
-                <p14:modId xmlns:p14="http://schemas.microsoft.com/office/powerpoint/2010/main" val="384093671"/>
+                <p14:modId xmlns:p14="http://schemas.microsoft.com/office/powerpoint/2010/main" val="1638794252"/>
               </p:ext>
             </p:extLst>
           </p:nvPr>
@@ -15477,7 +15553,7 @@
 </p:sld>
 </file>
 
-<file path=ppt/slides/slide5.xml><?xml version="1.0" encoding="utf-8"?>
+<file path=ppt/slides/slide4.xml><?xml version="1.0" encoding="utf-8"?>
 <p:sld xmlns:a="http://schemas.openxmlformats.org/drawingml/2006/main" xmlns:r="http://schemas.openxmlformats.org/officeDocument/2006/relationships" xmlns:p="http://schemas.openxmlformats.org/presentationml/2006/main">
   <p:cSld>
     <p:spTree>
@@ -15522,8 +15598,8 @@
           </a:p>
         </p:txBody>
       </p:sp>
-      <mc:AlternateContent xmlns:mc="http://schemas.openxmlformats.org/markup-compatibility/2006" xmlns:a14="http://schemas.microsoft.com/office/drawing/2010/main">
-        <mc:Choice Requires="a14">
+      <mc:AlternateContent xmlns:mc="http://schemas.openxmlformats.org/markup-compatibility/2006">
+        <mc:Choice xmlns:a14="http://schemas.microsoft.com/office/drawing/2010/main" Requires="a14">
           <p:sp>
             <p:nvSpPr>
               <p:cNvPr id="3" name="Inhaltsplatzhalter 2">
@@ -15606,8 +15682,41 @@
                   <a:rPr lang="en-GB" noProof="0" dirty="0">
                     <a:sym typeface="Wingdings" panose="05000000000000000000" pitchFamily="2" charset="2"/>
                   </a:rPr>
-                  <a:t>Unstable simulation: even with fixed joint positions, results are not reliable</a:t>
+                  <a:t>Unstable simulation</a:t>
                 </a:r>
+              </a:p>
+              <a:p>
+                <a:pPr lvl="1"/>
+                <a:r>
+                  <a:rPr lang="en-GB" dirty="0">
+                    <a:sym typeface="Wingdings" panose="05000000000000000000" pitchFamily="2" charset="2"/>
+                  </a:rPr>
+                  <a:t>E</a:t>
+                </a:r>
+                <a:r>
+                  <a:rPr lang="en-GB" noProof="0" dirty="0" err="1">
+                    <a:sym typeface="Wingdings" panose="05000000000000000000" pitchFamily="2" charset="2"/>
+                  </a:rPr>
+                  <a:t>ven</a:t>
+                </a:r>
+                <a:r>
+                  <a:rPr lang="en-GB" noProof="0" dirty="0">
+                    <a:sym typeface="Wingdings" panose="05000000000000000000" pitchFamily="2" charset="2"/>
+                  </a:rPr>
+                  <a:t> with fixed joint positions, results are not reliable</a:t>
+                </a:r>
+              </a:p>
+              <a:p>
+                <a:pPr lvl="1"/>
+                <a:r>
+                  <a:rPr lang="en-GB" dirty="0">
+                    <a:sym typeface="Wingdings" panose="05000000000000000000" pitchFamily="2" charset="2"/>
+                  </a:rPr>
+                  <a:t>Releasing the box at the correct timestep quite impossible to learn</a:t>
+                </a:r>
+                <a:endParaRPr lang="en-GB" noProof="0" dirty="0">
+                  <a:sym typeface="Wingdings" panose="05000000000000000000" pitchFamily="2" charset="2"/>
+                </a:endParaRPr>
               </a:p>
               <a:p>
                 <a:r>
@@ -15723,7 +15832,7 @@
             </p:txBody>
           </p:sp>
         </mc:Choice>
-        <mc:Fallback xmlns="">
+        <mc:Fallback>
           <p:sp>
             <p:nvSpPr>
               <p:cNvPr id="3" name="Inhaltsplatzhalter 2">
@@ -15742,7 +15851,7 @@
             </p:nvSpPr>
             <p:spPr>
               <a:blipFill>
-                <a:blip r:embed="rId2"/>
+                <a:blip r:embed="rId3"/>
                 <a:stretch>
                   <a:fillRect t="-3141" r="-821"/>
                 </a:stretch>
@@ -15815,7 +15924,7 @@
           <a:p>
             <a:fld id="{61696EC4-B4CF-4701-AD06-A8439D6D8E12}" type="slidenum">
               <a:rPr lang="de-DE" smtClean="0"/>
-              <a:t>5</a:t>
+              <a:t>4</a:t>
             </a:fld>
             <a:endParaRPr lang="de-DE"/>
           </a:p>
@@ -15834,7 +15943,7 @@
 </p:sld>
 </file>
 
-<file path=ppt/slides/slide6.xml><?xml version="1.0" encoding="utf-8"?>
+<file path=ppt/slides/slide5.xml><?xml version="1.0" encoding="utf-8"?>
 <p:sld xmlns:a="http://schemas.openxmlformats.org/drawingml/2006/main" xmlns:r="http://schemas.openxmlformats.org/officeDocument/2006/relationships" xmlns:p="http://schemas.openxmlformats.org/presentationml/2006/main">
   <p:cSld>
     <p:spTree>
@@ -15913,8 +16022,16 @@
           </a:p>
           <a:p>
             <a:r>
+              <a:rPr lang="en-GB" dirty="0"/>
+              <a:t>A</a:t>
+            </a:r>
+            <a:r>
+              <a:rPr lang="en-GB" noProof="0" dirty="0" err="1"/>
+              <a:t>ssume</a:t>
+            </a:r>
+            <a:r>
               <a:rPr lang="en-GB" noProof="0" dirty="0"/>
-              <a:t>assume that first try is enough to measure fitness</a:t>
+              <a:t> that first try is enough to measure fitness</a:t>
             </a:r>
             <a:endParaRPr lang="en-GB" noProof="0" dirty="0">
               <a:sym typeface="Wingdings" panose="05000000000000000000" pitchFamily="2" charset="2"/>
@@ -15924,6 +16041,9 @@
             <a:endParaRPr lang="en-GB" noProof="0" dirty="0"/>
           </a:p>
           <a:p>
+            <a:pPr marL="0" indent="0">
+              <a:buNone/>
+            </a:pPr>
             <a:endParaRPr lang="en-GB" noProof="0" dirty="0"/>
           </a:p>
         </p:txBody>
@@ -15980,7 +16100,7 @@
           <a:p>
             <a:fld id="{61696EC4-B4CF-4701-AD06-A8439D6D8E12}" type="slidenum">
               <a:rPr lang="de-DE" smtClean="0"/>
-              <a:t>6</a:t>
+              <a:t>5</a:t>
             </a:fld>
             <a:endParaRPr lang="de-DE"/>
           </a:p>
@@ -15999,7 +16119,7 @@
 </p:sld>
 </file>
 
-<file path=ppt/slides/slide7.xml><?xml version="1.0" encoding="utf-8"?>
+<file path=ppt/slides/slide6.xml><?xml version="1.0" encoding="utf-8"?>
 <p:sld xmlns:a="http://schemas.openxmlformats.org/drawingml/2006/main" xmlns:r="http://schemas.openxmlformats.org/officeDocument/2006/relationships" xmlns:p="http://schemas.openxmlformats.org/presentationml/2006/main">
   <p:cSld>
     <p:spTree>
@@ -16062,7 +16182,7 @@
                 <p:ph idx="1"/>
                 <p:extLst>
                   <p:ext uri="{D42A27DB-BD31-4B8C-83A1-F6EECF244321}">
-                    <p14:modId xmlns:p14="http://schemas.microsoft.com/office/powerpoint/2010/main" val="3356666116"/>
+                    <p14:modId xmlns:p14="http://schemas.microsoft.com/office/powerpoint/2010/main" val="467688679"/>
                   </p:ext>
                 </p:extLst>
               </p:nvPr>
@@ -16095,7 +16215,7 @@
                 <p:ph idx="1"/>
                 <p:extLst>
                   <p:ext uri="{D42A27DB-BD31-4B8C-83A1-F6EECF244321}">
-                    <p14:modId xmlns:p14="http://schemas.microsoft.com/office/powerpoint/2010/main" val="3356666116"/>
+                    <p14:modId xmlns:p14="http://schemas.microsoft.com/office/powerpoint/2010/main" val="467688679"/>
                   </p:ext>
                 </p:extLst>
               </p:nvPr>
@@ -16164,7 +16284,7 @@
           <a:p>
             <a:fld id="{61696EC4-B4CF-4701-AD06-A8439D6D8E12}" type="slidenum">
               <a:rPr lang="en-AU" smtClean="0"/>
-              <a:t>7</a:t>
+              <a:t>6</a:t>
             </a:fld>
             <a:endParaRPr lang="en-AU" dirty="0"/>
           </a:p>
@@ -16348,9 +16468,9 @@
         <p:grpSpPr>
           <a:xfrm>
             <a:off x="3345873" y="1231243"/>
-            <a:ext cx="8453677" cy="4807464"/>
+            <a:ext cx="9123218" cy="4807464"/>
             <a:chOff x="3345873" y="1231243"/>
-            <a:chExt cx="8453677" cy="4807464"/>
+            <a:chExt cx="9123218" cy="4807464"/>
           </a:xfrm>
         </p:grpSpPr>
         <p:grpSp>
@@ -16662,10 +16782,10 @@
                               <m:t>𝑘</m:t>
                             </m:r>
                             <m:r>
-                              <a:rPr lang="en-AU" b="0" i="1" smtClean="0">
+                              <a:rPr lang="de-DE" b="0" i="1" smtClean="0">
                                 <a:latin typeface="Cambria Math" panose="02040503050406030204" pitchFamily="18" charset="0"/>
                               </a:rPr>
-                              <m:t> </m:t>
+                              <m:t>−1 </m:t>
                             </m:r>
                           </m:sub>
                         </m:sSub>
@@ -16816,10 +16936,10 @@
           </p:nvGrpSpPr>
           <p:grpSpPr>
             <a:xfrm>
-              <a:off x="7515490" y="3773919"/>
-              <a:ext cx="4284060" cy="804204"/>
-              <a:chOff x="900" y="1792613"/>
-              <a:chExt cx="2702239" cy="683992"/>
+              <a:off x="7515488" y="3773919"/>
+              <a:ext cx="4953603" cy="804204"/>
+              <a:chOff x="899" y="1792613"/>
+              <a:chExt cx="3124565" cy="683992"/>
             </a:xfrm>
           </p:grpSpPr>
           <p:sp>
@@ -16836,8 +16956,8 @@
             </p:nvSpPr>
             <p:spPr>
               <a:xfrm>
-                <a:off x="900" y="1792613"/>
-                <a:ext cx="2702239" cy="675559"/>
+                <a:off x="899" y="1792613"/>
+                <a:ext cx="2739331" cy="675559"/>
               </a:xfrm>
               <a:prstGeom prst="roundRect">
                 <a:avLst>
@@ -16902,8 +17022,8 @@
                 </p:nvSpPr>
                 <p:spPr>
                   <a:xfrm>
-                    <a:off x="20686" y="1840618"/>
-                    <a:ext cx="2662667" cy="635987"/>
+                    <a:off x="20685" y="1840618"/>
+                    <a:ext cx="3104779" cy="635987"/>
                   </a:xfrm>
                   <a:prstGeom prst="rect">
                     <a:avLst/>
@@ -16976,6 +17096,12 @@
                               </a:rPr>
                               <m:t>𝑘</m:t>
                             </m:r>
+                            <m:r>
+                              <a:rPr lang="de-DE" b="0" i="1" smtClean="0">
+                                <a:latin typeface="Cambria Math" panose="02040503050406030204" pitchFamily="18" charset="0"/>
+                              </a:rPr>
+                              <m:t>−1</m:t>
+                            </m:r>
                           </m:sub>
                         </m:sSub>
                       </m:oMath>
@@ -17024,8 +17150,8 @@
                 </p:nvSpPr>
                 <p:spPr>
                   <a:xfrm>
-                    <a:off x="20686" y="1840618"/>
-                    <a:ext cx="2662667" cy="635987"/>
+                    <a:off x="20685" y="1840618"/>
+                    <a:ext cx="3104779" cy="635987"/>
                   </a:xfrm>
                   <a:prstGeom prst="rect">
                     <a:avLst/>
@@ -17033,7 +17159,7 @@
                   <a:blipFill>
                     <a:blip r:embed="rId11"/>
                     <a:stretch>
-                      <a:fillRect l="-1879" t="-3252" b="-8943"/>
+                      <a:fillRect l="-1611" t="-3252" b="-8943"/>
                     </a:stretch>
                   </a:blipFill>
                 </p:spPr>
@@ -17912,7 +18038,7 @@
 </p:sld>
 </file>
 
-<file path=ppt/slides/slide8.xml><?xml version="1.0" encoding="utf-8"?>
+<file path=ppt/slides/slide7.xml><?xml version="1.0" encoding="utf-8"?>
 <p:sld xmlns:a="http://schemas.openxmlformats.org/drawingml/2006/main" xmlns:r="http://schemas.openxmlformats.org/officeDocument/2006/relationships" xmlns:p="http://schemas.openxmlformats.org/presentationml/2006/main">
   <p:cSld>
     <p:spTree>
@@ -18082,7 +18208,7 @@
           <a:p>
             <a:fld id="{61696EC4-B4CF-4701-AD06-A8439D6D8E12}" type="slidenum">
               <a:rPr lang="en-AU" smtClean="0"/>
-              <a:t>8</a:t>
+              <a:t>7</a:t>
             </a:fld>
             <a:endParaRPr lang="en-AU"/>
           </a:p>
@@ -18514,7 +18640,7 @@
 </p:sld>
 </file>
 
-<file path=ppt/slides/slide9.xml><?xml version="1.0" encoding="utf-8"?>
+<file path=ppt/slides/slide8.xml><?xml version="1.0" encoding="utf-8"?>
 <p:sld xmlns:a="http://schemas.openxmlformats.org/drawingml/2006/main" xmlns:r="http://schemas.openxmlformats.org/officeDocument/2006/relationships" xmlns:p="http://schemas.openxmlformats.org/presentationml/2006/main">
   <p:cSld>
     <p:spTree>
@@ -18531,6 +18657,41 @@
           <a:chExt cx="0" cy="0"/>
         </a:xfrm>
       </p:grpSpPr>
+      <p:pic>
+        <p:nvPicPr>
+          <p:cNvPr id="8" name="Grafik 7">
+            <a:extLst>
+              <a:ext uri="{FF2B5EF4-FFF2-40B4-BE49-F238E27FC236}">
+                <a16:creationId xmlns:a16="http://schemas.microsoft.com/office/drawing/2014/main" id="{5D0A26DB-CEB7-4AD0-B915-9C0863834A38}"/>
+              </a:ext>
+            </a:extLst>
+          </p:cNvPr>
+          <p:cNvPicPr>
+            <a:picLocks noChangeAspect="1"/>
+          </p:cNvPicPr>
+          <p:nvPr/>
+        </p:nvPicPr>
+        <p:blipFill rotWithShape="1">
+          <a:blip r:embed="rId2">
+            <a:extLst>
+              <a:ext uri="{28A0092B-C50C-407E-A947-70E740481C1C}">
+                <a14:useLocalDpi xmlns:a14="http://schemas.microsoft.com/office/drawing/2010/main" val="0"/>
+              </a:ext>
+            </a:extLst>
+          </a:blip>
+          <a:srcRect r="8930"/>
+          <a:stretch/>
+        </p:blipFill>
+        <p:spPr>
+          <a:xfrm>
+            <a:off x="6535879" y="1997449"/>
+            <a:ext cx="5268195" cy="4338614"/>
+          </a:xfrm>
+          <a:prstGeom prst="rect">
+            <a:avLst/>
+          </a:prstGeom>
+        </p:spPr>
+      </p:pic>
       <p:sp>
         <p:nvSpPr>
           <p:cNvPr id="2" name="Titel 1">
@@ -18615,7 +18776,7 @@
           <a:p>
             <a:fld id="{61696EC4-B4CF-4701-AD06-A8439D6D8E12}" type="slidenum">
               <a:rPr lang="de-DE" smtClean="0"/>
-              <a:t>9</a:t>
+              <a:t>8</a:t>
             </a:fld>
             <a:endParaRPr lang="de-DE"/>
           </a:p>
@@ -18634,25 +18795,523 @@
           <p:nvPr>
             <p:extLst>
               <p:ext uri="{D42A27DB-BD31-4B8C-83A1-F6EECF244321}">
-                <p14:modId xmlns:p14="http://schemas.microsoft.com/office/powerpoint/2010/main" val="722562373"/>
+                <p14:modId xmlns:p14="http://schemas.microsoft.com/office/powerpoint/2010/main" val="3561814055"/>
               </p:ext>
             </p:extLst>
           </p:nvPr>
         </p:nvGraphicFramePr>
         <p:xfrm>
-          <a:off x="524664" y="1284951"/>
-          <a:ext cx="5683829" cy="4946507"/>
+          <a:off x="233718" y="1284951"/>
+          <a:ext cx="6291772" cy="4783340"/>
         </p:xfrm>
         <a:graphic>
           <a:graphicData uri="http://schemas.openxmlformats.org/drawingml/2006/diagram">
-            <dgm:relIds xmlns:dgm="http://schemas.openxmlformats.org/drawingml/2006/diagram" xmlns:r="http://schemas.openxmlformats.org/officeDocument/2006/relationships" r:dm="rId2" r:lo="rId3" r:qs="rId4" r:cs="rId5"/>
+            <dgm:relIds xmlns:dgm="http://schemas.openxmlformats.org/drawingml/2006/diagram" xmlns:r="http://schemas.openxmlformats.org/officeDocument/2006/relationships" r:dm="rId3" r:lo="rId4" r:qs="rId5" r:cs="rId6"/>
           </a:graphicData>
         </a:graphic>
       </p:graphicFrame>
+      <p:sp>
+        <p:nvSpPr>
+          <p:cNvPr id="9" name="Textfeld 8">
+            <a:extLst>
+              <a:ext uri="{FF2B5EF4-FFF2-40B4-BE49-F238E27FC236}">
+                <a16:creationId xmlns:a16="http://schemas.microsoft.com/office/drawing/2014/main" id="{6CAC95EB-8297-42B7-83DE-ED15B42D9CC5}"/>
+              </a:ext>
+            </a:extLst>
+          </p:cNvPr>
+          <p:cNvSpPr txBox="1"/>
+          <p:nvPr/>
+        </p:nvSpPr>
+        <p:spPr>
+          <a:xfrm>
+            <a:off x="7398327" y="1610591"/>
+            <a:ext cx="3896591" cy="369332"/>
+          </a:xfrm>
+          <a:prstGeom prst="rect">
+            <a:avLst/>
+          </a:prstGeom>
+          <a:noFill/>
+        </p:spPr>
+        <p:txBody>
+          <a:bodyPr wrap="square" rtlCol="0">
+            <a:spAutoFit/>
+          </a:bodyPr>
+          <a:lstStyle/>
+          <a:p>
+            <a:r>
+              <a:rPr lang="en-AU" dirty="0"/>
+              <a:t>No plot, best distance 25m </a:t>
+            </a:r>
+          </a:p>
+        </p:txBody>
+      </p:sp>
     </p:spTree>
     <p:extLst>
       <p:ext uri="{BB962C8B-B14F-4D97-AF65-F5344CB8AC3E}">
         <p14:creationId xmlns:p14="http://schemas.microsoft.com/office/powerpoint/2010/main" val="2497491100"/>
+      </p:ext>
+    </p:extLst>
+  </p:cSld>
+  <p:clrMapOvr>
+    <a:masterClrMapping/>
+  </p:clrMapOvr>
+</p:sld>
+</file>
+
+<file path=ppt/slides/slide9.xml><?xml version="1.0" encoding="utf-8"?>
+<p:sld xmlns:a="http://schemas.openxmlformats.org/drawingml/2006/main" xmlns:r="http://schemas.openxmlformats.org/officeDocument/2006/relationships" xmlns:p="http://schemas.openxmlformats.org/presentationml/2006/main">
+  <p:cSld>
+    <p:spTree>
+      <p:nvGrpSpPr>
+        <p:cNvPr id="1" name=""/>
+        <p:cNvGrpSpPr/>
+        <p:nvPr/>
+      </p:nvGrpSpPr>
+      <p:grpSpPr>
+        <a:xfrm>
+          <a:off x="0" y="0"/>
+          <a:ext cx="0" cy="0"/>
+          <a:chOff x="0" y="0"/>
+          <a:chExt cx="0" cy="0"/>
+        </a:xfrm>
+      </p:grpSpPr>
+      <p:pic>
+        <p:nvPicPr>
+          <p:cNvPr id="7" name="Inhaltsplatzhalter 6">
+            <a:extLst>
+              <a:ext uri="{FF2B5EF4-FFF2-40B4-BE49-F238E27FC236}">
+                <a16:creationId xmlns:a16="http://schemas.microsoft.com/office/drawing/2014/main" id="{28FE283A-6D62-402E-B52F-75E82ECFB270}"/>
+              </a:ext>
+            </a:extLst>
+          </p:cNvPr>
+          <p:cNvPicPr>
+            <a:picLocks noGrp="1" noChangeAspect="1"/>
+          </p:cNvPicPr>
+          <p:nvPr>
+            <p:ph idx="1"/>
+          </p:nvPr>
+        </p:nvPicPr>
+        <p:blipFill rotWithShape="1">
+          <a:blip r:embed="rId2">
+            <a:extLst>
+              <a:ext uri="{28A0092B-C50C-407E-A947-70E740481C1C}">
+                <a14:useLocalDpi xmlns:a14="http://schemas.microsoft.com/office/drawing/2010/main" val="0"/>
+              </a:ext>
+            </a:extLst>
+          </a:blip>
+          <a:srcRect t="10832" r="9348"/>
+          <a:stretch/>
+        </p:blipFill>
+        <p:spPr>
+          <a:xfrm>
+            <a:off x="4769065" y="1110341"/>
+            <a:ext cx="7005400" cy="5167970"/>
+          </a:xfrm>
+        </p:spPr>
+      </p:pic>
+      <p:sp>
+        <p:nvSpPr>
+          <p:cNvPr id="2" name="Titel 1">
+            <a:extLst>
+              <a:ext uri="{FF2B5EF4-FFF2-40B4-BE49-F238E27FC236}">
+                <a16:creationId xmlns:a16="http://schemas.microsoft.com/office/drawing/2014/main" id="{D98E68FC-A505-4FFE-B77B-CAC6136AA1C0}"/>
+              </a:ext>
+            </a:extLst>
+          </p:cNvPr>
+          <p:cNvSpPr>
+            <a:spLocks noGrp="1"/>
+          </p:cNvSpPr>
+          <p:nvPr>
+            <p:ph type="title"/>
+          </p:nvPr>
+        </p:nvSpPr>
+        <p:spPr/>
+        <p:txBody>
+          <a:bodyPr/>
+          <a:lstStyle/>
+          <a:p>
+            <a:r>
+              <a:rPr lang="en-US" dirty="0"/>
+              <a:t>Results II</a:t>
+            </a:r>
+          </a:p>
+        </p:txBody>
+      </p:sp>
+      <p:sp>
+        <p:nvSpPr>
+          <p:cNvPr id="4" name="Datumsplatzhalter 3">
+            <a:extLst>
+              <a:ext uri="{FF2B5EF4-FFF2-40B4-BE49-F238E27FC236}">
+                <a16:creationId xmlns:a16="http://schemas.microsoft.com/office/drawing/2014/main" id="{57044CCF-8989-4BE0-879E-00494803380E}"/>
+              </a:ext>
+            </a:extLst>
+          </p:cNvPr>
+          <p:cNvSpPr>
+            <a:spLocks noGrp="1"/>
+          </p:cNvSpPr>
+          <p:nvPr>
+            <p:ph type="dt" sz="half" idx="10"/>
+          </p:nvPr>
+        </p:nvSpPr>
+        <p:spPr/>
+        <p:txBody>
+          <a:bodyPr/>
+          <a:lstStyle/>
+          <a:p>
+            <a:fld id="{801FBE94-C069-4C95-AA74-CDBC26339DEF}" type="datetime1">
+              <a:rPr lang="de-DE" smtClean="0"/>
+              <a:t>13.02.2019</a:t>
+            </a:fld>
+            <a:endParaRPr lang="de-DE" dirty="0"/>
+          </a:p>
+        </p:txBody>
+      </p:sp>
+      <p:sp>
+        <p:nvSpPr>
+          <p:cNvPr id="5" name="Foliennummernplatzhalter 4">
+            <a:extLst>
+              <a:ext uri="{FF2B5EF4-FFF2-40B4-BE49-F238E27FC236}">
+                <a16:creationId xmlns:a16="http://schemas.microsoft.com/office/drawing/2014/main" id="{B78F5029-7252-4249-BDAD-71305BEFBE3D}"/>
+              </a:ext>
+            </a:extLst>
+          </p:cNvPr>
+          <p:cNvSpPr>
+            <a:spLocks noGrp="1"/>
+          </p:cNvSpPr>
+          <p:nvPr>
+            <p:ph type="sldNum" sz="quarter" idx="12"/>
+          </p:nvPr>
+        </p:nvSpPr>
+        <p:spPr/>
+        <p:txBody>
+          <a:bodyPr/>
+          <a:lstStyle/>
+          <a:p>
+            <a:fld id="{61696EC4-B4CF-4701-AD06-A8439D6D8E12}" type="slidenum">
+              <a:rPr lang="de-DE" smtClean="0"/>
+              <a:t>9</a:t>
+            </a:fld>
+            <a:endParaRPr lang="de-DE"/>
+          </a:p>
+        </p:txBody>
+      </p:sp>
+      <p:sp>
+        <p:nvSpPr>
+          <p:cNvPr id="9" name="Inhaltsplatzhalter 2">
+            <a:extLst>
+              <a:ext uri="{FF2B5EF4-FFF2-40B4-BE49-F238E27FC236}">
+                <a16:creationId xmlns:a16="http://schemas.microsoft.com/office/drawing/2014/main" id="{FCC69E2C-02CB-4762-A77A-E21D3D57D2E3}"/>
+              </a:ext>
+            </a:extLst>
+          </p:cNvPr>
+          <p:cNvSpPr txBox="1">
+            <a:spLocks/>
+          </p:cNvSpPr>
+          <p:nvPr/>
+        </p:nvSpPr>
+        <p:spPr>
+          <a:xfrm>
+            <a:off x="524664" y="1269206"/>
+            <a:ext cx="11142672" cy="4850241"/>
+          </a:xfrm>
+          <a:prstGeom prst="rect">
+            <a:avLst/>
+          </a:prstGeom>
+        </p:spPr>
+        <p:txBody>
+          <a:bodyPr vert="horz" lIns="0" tIns="0" rIns="0" bIns="0" rtlCol="0">
+            <a:normAutofit/>
+          </a:bodyPr>
+          <a:lstStyle>
+            <a:lvl1pPr marL="361950" indent="-361950" algn="l" defTabSz="914400" rtl="0" eaLnBrk="1" latinLnBrk="0" hangingPunct="1">
+              <a:lnSpc>
+                <a:spcPct val="90000"/>
+              </a:lnSpc>
+              <a:spcBef>
+                <a:spcPts val="600"/>
+              </a:spcBef>
+              <a:buSzPct val="88000"/>
+              <a:buFontTx/>
+              <a:buBlip>
+                <a:blip r:embed="rId3"/>
+              </a:buBlip>
+              <a:defRPr sz="2800" kern="1200">
+                <a:solidFill>
+                  <a:schemeClr val="tx1"/>
+                </a:solidFill>
+                <a:latin typeface="+mn-lt"/>
+                <a:ea typeface="+mn-ea"/>
+                <a:cs typeface="+mn-cs"/>
+              </a:defRPr>
+            </a:lvl1pPr>
+            <a:lvl2pPr marL="809625" indent="-361950" algn="l" defTabSz="914400" rtl="0" eaLnBrk="1" latinLnBrk="0" hangingPunct="1">
+              <a:lnSpc>
+                <a:spcPct val="90000"/>
+              </a:lnSpc>
+              <a:spcBef>
+                <a:spcPts val="600"/>
+              </a:spcBef>
+              <a:buSzPct val="88000"/>
+              <a:buFontTx/>
+              <a:buBlip>
+                <a:blip r:embed="rId3"/>
+              </a:buBlip>
+              <a:defRPr sz="2400" kern="1200">
+                <a:solidFill>
+                  <a:schemeClr val="tx1"/>
+                </a:solidFill>
+                <a:latin typeface="+mn-lt"/>
+                <a:ea typeface="+mn-ea"/>
+                <a:cs typeface="+mn-cs"/>
+              </a:defRPr>
+            </a:lvl2pPr>
+            <a:lvl3pPr marL="1257300" indent="-361950" algn="l" defTabSz="914400" rtl="0" eaLnBrk="1" latinLnBrk="0" hangingPunct="1">
+              <a:lnSpc>
+                <a:spcPct val="90000"/>
+              </a:lnSpc>
+              <a:spcBef>
+                <a:spcPts val="600"/>
+              </a:spcBef>
+              <a:buSzPct val="88000"/>
+              <a:buFontTx/>
+              <a:buBlip>
+                <a:blip r:embed="rId3"/>
+              </a:buBlip>
+              <a:defRPr sz="2000" kern="1200">
+                <a:solidFill>
+                  <a:schemeClr val="tx1"/>
+                </a:solidFill>
+                <a:latin typeface="+mn-lt"/>
+                <a:ea typeface="+mn-ea"/>
+                <a:cs typeface="+mn-cs"/>
+              </a:defRPr>
+            </a:lvl3pPr>
+            <a:lvl4pPr marL="1704975" indent="-361950" algn="l" defTabSz="914400" rtl="0" eaLnBrk="1" latinLnBrk="0" hangingPunct="1">
+              <a:lnSpc>
+                <a:spcPct val="90000"/>
+              </a:lnSpc>
+              <a:spcBef>
+                <a:spcPts val="600"/>
+              </a:spcBef>
+              <a:buSzPct val="88000"/>
+              <a:buFontTx/>
+              <a:buBlip>
+                <a:blip r:embed="rId3"/>
+              </a:buBlip>
+              <a:defRPr sz="2000" kern="1200">
+                <a:solidFill>
+                  <a:schemeClr val="tx1"/>
+                </a:solidFill>
+                <a:latin typeface="+mn-lt"/>
+                <a:ea typeface="+mn-ea"/>
+                <a:cs typeface="+mn-cs"/>
+              </a:defRPr>
+            </a:lvl4pPr>
+            <a:lvl5pPr marL="2152650" indent="-361950" algn="l" defTabSz="914400" rtl="0" eaLnBrk="1" latinLnBrk="0" hangingPunct="1">
+              <a:lnSpc>
+                <a:spcPct val="90000"/>
+              </a:lnSpc>
+              <a:spcBef>
+                <a:spcPts val="600"/>
+              </a:spcBef>
+              <a:buSzPct val="88000"/>
+              <a:buFontTx/>
+              <a:buBlip>
+                <a:blip r:embed="rId3"/>
+              </a:buBlip>
+              <a:defRPr sz="2000" kern="1200">
+                <a:solidFill>
+                  <a:schemeClr val="tx1"/>
+                </a:solidFill>
+                <a:latin typeface="+mn-lt"/>
+                <a:ea typeface="+mn-ea"/>
+                <a:cs typeface="+mn-cs"/>
+              </a:defRPr>
+            </a:lvl5pPr>
+            <a:lvl6pPr marL="2514600" indent="-228600" algn="l" defTabSz="914400" rtl="0" eaLnBrk="1" latinLnBrk="0" hangingPunct="1">
+              <a:lnSpc>
+                <a:spcPct val="90000"/>
+              </a:lnSpc>
+              <a:spcBef>
+                <a:spcPts val="500"/>
+              </a:spcBef>
+              <a:buFont typeface="Arial" panose="020B0604020202020204" pitchFamily="34" charset="0"/>
+              <a:buChar char="•"/>
+              <a:defRPr sz="1800" kern="1200">
+                <a:solidFill>
+                  <a:schemeClr val="tx1"/>
+                </a:solidFill>
+                <a:latin typeface="+mn-lt"/>
+                <a:ea typeface="+mn-ea"/>
+                <a:cs typeface="+mn-cs"/>
+              </a:defRPr>
+            </a:lvl6pPr>
+            <a:lvl7pPr marL="2971800" indent="-228600" algn="l" defTabSz="914400" rtl="0" eaLnBrk="1" latinLnBrk="0" hangingPunct="1">
+              <a:lnSpc>
+                <a:spcPct val="90000"/>
+              </a:lnSpc>
+              <a:spcBef>
+                <a:spcPts val="500"/>
+              </a:spcBef>
+              <a:buFont typeface="Arial" panose="020B0604020202020204" pitchFamily="34" charset="0"/>
+              <a:buChar char="•"/>
+              <a:defRPr sz="1800" kern="1200">
+                <a:solidFill>
+                  <a:schemeClr val="tx1"/>
+                </a:solidFill>
+                <a:latin typeface="+mn-lt"/>
+                <a:ea typeface="+mn-ea"/>
+                <a:cs typeface="+mn-cs"/>
+              </a:defRPr>
+            </a:lvl7pPr>
+            <a:lvl8pPr marL="3429000" indent="-228600" algn="l" defTabSz="914400" rtl="0" eaLnBrk="1" latinLnBrk="0" hangingPunct="1">
+              <a:lnSpc>
+                <a:spcPct val="90000"/>
+              </a:lnSpc>
+              <a:spcBef>
+                <a:spcPts val="500"/>
+              </a:spcBef>
+              <a:buFont typeface="Arial" panose="020B0604020202020204" pitchFamily="34" charset="0"/>
+              <a:buChar char="•"/>
+              <a:defRPr sz="1800" kern="1200">
+                <a:solidFill>
+                  <a:schemeClr val="tx1"/>
+                </a:solidFill>
+                <a:latin typeface="+mn-lt"/>
+                <a:ea typeface="+mn-ea"/>
+                <a:cs typeface="+mn-cs"/>
+              </a:defRPr>
+            </a:lvl8pPr>
+            <a:lvl9pPr marL="3886200" indent="-228600" algn="l" defTabSz="914400" rtl="0" eaLnBrk="1" latinLnBrk="0" hangingPunct="1">
+              <a:lnSpc>
+                <a:spcPct val="90000"/>
+              </a:lnSpc>
+              <a:spcBef>
+                <a:spcPts val="500"/>
+              </a:spcBef>
+              <a:buFont typeface="Arial" panose="020B0604020202020204" pitchFamily="34" charset="0"/>
+              <a:buChar char="•"/>
+              <a:defRPr sz="1800" kern="1200">
+                <a:solidFill>
+                  <a:schemeClr val="tx1"/>
+                </a:solidFill>
+                <a:latin typeface="+mn-lt"/>
+                <a:ea typeface="+mn-ea"/>
+                <a:cs typeface="+mn-cs"/>
+              </a:defRPr>
+            </a:lvl9pPr>
+          </a:lstStyle>
+          <a:p>
+            <a:r>
+              <a:rPr lang="en-AU" dirty="0"/>
+              <a:t>Same approaches but not</a:t>
+            </a:r>
+          </a:p>
+          <a:p>
+            <a:pPr marL="0" indent="0">
+              <a:buNone/>
+            </a:pPr>
+            <a:r>
+              <a:rPr lang="en-AU" dirty="0"/>
+              <a:t>cut for values above 250 m</a:t>
+            </a:r>
+          </a:p>
+          <a:p>
+            <a:r>
+              <a:rPr lang="en-AU" dirty="0"/>
+              <a:t>Logarithmic scale</a:t>
+            </a:r>
+          </a:p>
+          <a:p>
+            <a:r>
+              <a:rPr lang="en-AU" dirty="0"/>
+              <a:t>Distances caused </a:t>
+            </a:r>
+          </a:p>
+          <a:p>
+            <a:pPr marL="0" indent="0">
+              <a:buNone/>
+            </a:pPr>
+            <a:r>
+              <a:rPr lang="en-AU" dirty="0"/>
+              <a:t>by “exploding” hand during</a:t>
+            </a:r>
+          </a:p>
+          <a:p>
+            <a:pPr marL="0" indent="0">
+              <a:buNone/>
+            </a:pPr>
+            <a:r>
+              <a:rPr lang="en-AU" dirty="0"/>
+              <a:t>throwing</a:t>
+            </a:r>
+          </a:p>
+          <a:p>
+            <a:r>
+              <a:rPr lang="en-AU" dirty="0"/>
+              <a:t>Reason why “normal” </a:t>
+            </a:r>
+          </a:p>
+          <a:p>
+            <a:pPr marL="0" indent="0">
+              <a:buNone/>
+            </a:pPr>
+            <a:r>
+              <a:rPr lang="en-AU" dirty="0"/>
+              <a:t>results could not improve</a:t>
+            </a:r>
+          </a:p>
+          <a:p>
+            <a:pPr marL="0" indent="0">
+              <a:buNone/>
+            </a:pPr>
+            <a:r>
+              <a:rPr lang="en-AU" dirty="0"/>
+              <a:t> </a:t>
+            </a:r>
+          </a:p>
+          <a:p>
+            <a:pPr marL="0" indent="0">
+              <a:buNone/>
+            </a:pPr>
+            <a:endParaRPr lang="en-AU" dirty="0"/>
+          </a:p>
+          <a:p>
+            <a:pPr marL="0" indent="0">
+              <a:buNone/>
+            </a:pPr>
+            <a:endParaRPr lang="en-AU" dirty="0"/>
+          </a:p>
+          <a:p>
+            <a:endParaRPr lang="en-AU" dirty="0"/>
+          </a:p>
+          <a:p>
+            <a:pPr marL="0" indent="0">
+              <a:buFontTx/>
+              <a:buNone/>
+            </a:pPr>
+            <a:endParaRPr lang="en-AU" dirty="0"/>
+          </a:p>
+          <a:p>
+            <a:pPr marL="0" indent="0">
+              <a:buFontTx/>
+              <a:buNone/>
+            </a:pPr>
+            <a:endParaRPr lang="en-AU" dirty="0"/>
+          </a:p>
+          <a:p>
+            <a:pPr marL="0" indent="0">
+              <a:buFontTx/>
+              <a:buNone/>
+            </a:pPr>
+            <a:endParaRPr lang="en-AU" dirty="0"/>
+          </a:p>
+        </p:txBody>
+      </p:sp>
+    </p:spTree>
+    <p:extLst>
+      <p:ext uri="{BB962C8B-B14F-4D97-AF65-F5344CB8AC3E}">
+        <p14:creationId xmlns:p14="http://schemas.microsoft.com/office/powerpoint/2010/main" val="3404722780"/>
       </p:ext>
     </p:extLst>
   </p:cSld>

</xml_diff>

<commit_message>
added presentation with new distance plots
</commit_message>
<xml_diff>
--- a/Gruppe4_Abschlusspraesentation.pptx
+++ b/Gruppe4_Abschlusspraesentation.pptx
@@ -4184,7 +4184,7 @@
   <dgm:whole/>
   <dgm:extLst>
     <a:ext uri="http://schemas.microsoft.com/office/drawing/2008/diagram">
-      <dsp:dataModelExt xmlns:dsp="http://schemas.microsoft.com/office/drawing/2008/diagram" relId="rId7" minVer="http://schemas.openxmlformats.org/drawingml/2006/diagram"/>
+      <dsp:dataModelExt xmlns:dsp="http://schemas.microsoft.com/office/drawing/2008/diagram" relId="rId8" minVer="http://schemas.openxmlformats.org/drawingml/2006/diagram"/>
     </a:ext>
   </dgm:extLst>
 </dgm:dataModel>
@@ -10722,6 +10722,174 @@
 </file>
 
 <file path=ppt/notesSlides/notesSlide7.xml><?xml version="1.0" encoding="utf-8"?>
+<p:notes xmlns:a="http://schemas.openxmlformats.org/drawingml/2006/main" xmlns:r="http://schemas.openxmlformats.org/officeDocument/2006/relationships" xmlns:p="http://schemas.openxmlformats.org/presentationml/2006/main">
+  <p:cSld>
+    <p:spTree>
+      <p:nvGrpSpPr>
+        <p:cNvPr id="1" name=""/>
+        <p:cNvGrpSpPr/>
+        <p:nvPr/>
+      </p:nvGrpSpPr>
+      <p:grpSpPr>
+        <a:xfrm>
+          <a:off x="0" y="0"/>
+          <a:ext cx="0" cy="0"/>
+          <a:chOff x="0" y="0"/>
+          <a:chExt cx="0" cy="0"/>
+        </a:xfrm>
+      </p:grpSpPr>
+      <p:sp>
+        <p:nvSpPr>
+          <p:cNvPr id="2" name="Folienbildplatzhalter 1"/>
+          <p:cNvSpPr>
+            <a:spLocks noGrp="1" noRot="1" noChangeAspect="1"/>
+          </p:cNvSpPr>
+          <p:nvPr>
+            <p:ph type="sldImg"/>
+          </p:nvPr>
+        </p:nvSpPr>
+        <p:spPr/>
+      </p:sp>
+      <p:sp>
+        <p:nvSpPr>
+          <p:cNvPr id="3" name="Notizenplatzhalter 2"/>
+          <p:cNvSpPr>
+            <a:spLocks noGrp="1"/>
+          </p:cNvSpPr>
+          <p:nvPr>
+            <p:ph type="body" idx="1"/>
+          </p:nvPr>
+        </p:nvSpPr>
+        <p:spPr/>
+        <p:txBody>
+          <a:bodyPr/>
+          <a:lstStyle/>
+          <a:p>
+            <a:endParaRPr lang="en-US" dirty="0"/>
+          </a:p>
+        </p:txBody>
+      </p:sp>
+      <p:sp>
+        <p:nvSpPr>
+          <p:cNvPr id="4" name="Foliennummernplatzhalter 3"/>
+          <p:cNvSpPr>
+            <a:spLocks noGrp="1"/>
+          </p:cNvSpPr>
+          <p:nvPr>
+            <p:ph type="sldNum" sz="quarter" idx="5"/>
+          </p:nvPr>
+        </p:nvSpPr>
+        <p:spPr/>
+        <p:txBody>
+          <a:bodyPr/>
+          <a:lstStyle/>
+          <a:p>
+            <a:fld id="{E13F729A-0AF0-4995-B32B-9504BC68960C}" type="slidenum">
+              <a:rPr lang="de-DE" smtClean="0"/>
+              <a:t>8</a:t>
+            </a:fld>
+            <a:endParaRPr lang="de-DE"/>
+          </a:p>
+        </p:txBody>
+      </p:sp>
+    </p:spTree>
+    <p:extLst>
+      <p:ext uri="{BB962C8B-B14F-4D97-AF65-F5344CB8AC3E}">
+        <p14:creationId xmlns:p14="http://schemas.microsoft.com/office/powerpoint/2010/main" val="1858343039"/>
+      </p:ext>
+    </p:extLst>
+  </p:cSld>
+  <p:clrMapOvr>
+    <a:masterClrMapping/>
+  </p:clrMapOvr>
+</p:notes>
+</file>
+
+<file path=ppt/notesSlides/notesSlide8.xml><?xml version="1.0" encoding="utf-8"?>
+<p:notes xmlns:a="http://schemas.openxmlformats.org/drawingml/2006/main" xmlns:r="http://schemas.openxmlformats.org/officeDocument/2006/relationships" xmlns:p="http://schemas.openxmlformats.org/presentationml/2006/main">
+  <p:cSld>
+    <p:spTree>
+      <p:nvGrpSpPr>
+        <p:cNvPr id="1" name=""/>
+        <p:cNvGrpSpPr/>
+        <p:nvPr/>
+      </p:nvGrpSpPr>
+      <p:grpSpPr>
+        <a:xfrm>
+          <a:off x="0" y="0"/>
+          <a:ext cx="0" cy="0"/>
+          <a:chOff x="0" y="0"/>
+          <a:chExt cx="0" cy="0"/>
+        </a:xfrm>
+      </p:grpSpPr>
+      <p:sp>
+        <p:nvSpPr>
+          <p:cNvPr id="2" name="Folienbildplatzhalter 1"/>
+          <p:cNvSpPr>
+            <a:spLocks noGrp="1" noRot="1" noChangeAspect="1"/>
+          </p:cNvSpPr>
+          <p:nvPr>
+            <p:ph type="sldImg"/>
+          </p:nvPr>
+        </p:nvSpPr>
+        <p:spPr/>
+      </p:sp>
+      <p:sp>
+        <p:nvSpPr>
+          <p:cNvPr id="3" name="Notizenplatzhalter 2"/>
+          <p:cNvSpPr>
+            <a:spLocks noGrp="1"/>
+          </p:cNvSpPr>
+          <p:nvPr>
+            <p:ph type="body" idx="1"/>
+          </p:nvPr>
+        </p:nvSpPr>
+        <p:spPr/>
+        <p:txBody>
+          <a:bodyPr/>
+          <a:lstStyle/>
+          <a:p>
+            <a:endParaRPr lang="en-US" dirty="0"/>
+          </a:p>
+        </p:txBody>
+      </p:sp>
+      <p:sp>
+        <p:nvSpPr>
+          <p:cNvPr id="4" name="Foliennummernplatzhalter 3"/>
+          <p:cNvSpPr>
+            <a:spLocks noGrp="1"/>
+          </p:cNvSpPr>
+          <p:nvPr>
+            <p:ph type="sldNum" sz="quarter" idx="5"/>
+          </p:nvPr>
+        </p:nvSpPr>
+        <p:spPr/>
+        <p:txBody>
+          <a:bodyPr/>
+          <a:lstStyle/>
+          <a:p>
+            <a:fld id="{E13F729A-0AF0-4995-B32B-9504BC68960C}" type="slidenum">
+              <a:rPr lang="de-DE" smtClean="0"/>
+              <a:t>9</a:t>
+            </a:fld>
+            <a:endParaRPr lang="de-DE"/>
+          </a:p>
+        </p:txBody>
+      </p:sp>
+    </p:spTree>
+    <p:extLst>
+      <p:ext uri="{BB962C8B-B14F-4D97-AF65-F5344CB8AC3E}">
+        <p14:creationId xmlns:p14="http://schemas.microsoft.com/office/powerpoint/2010/main" val="4021281730"/>
+      </p:ext>
+    </p:extLst>
+  </p:cSld>
+  <p:clrMapOvr>
+    <a:masterClrMapping/>
+  </p:clrMapOvr>
+</p:notes>
+</file>
+
+<file path=ppt/notesSlides/notesSlide9.xml><?xml version="1.0" encoding="utf-8"?>
 <p:notes xmlns:a="http://schemas.openxmlformats.org/drawingml/2006/main" xmlns:r="http://schemas.openxmlformats.org/officeDocument/2006/relationships" xmlns:p="http://schemas.openxmlformats.org/presentationml/2006/main">
   <p:cSld>
     <p:spTree>
@@ -18672,7 +18840,7 @@
           <p:nvPr/>
         </p:nvPicPr>
         <p:blipFill rotWithShape="1">
-          <a:blip r:embed="rId2">
+          <a:blip r:embed="rId3">
             <a:extLst>
               <a:ext uri="{28A0092B-C50C-407E-A947-70E740481C1C}">
                 <a14:useLocalDpi xmlns:a14="http://schemas.microsoft.com/office/drawing/2010/main" val="0"/>
@@ -18806,7 +18974,7 @@
         </p:xfrm>
         <a:graphic>
           <a:graphicData uri="http://schemas.openxmlformats.org/drawingml/2006/diagram">
-            <dgm:relIds xmlns:dgm="http://schemas.openxmlformats.org/drawingml/2006/diagram" xmlns:r="http://schemas.openxmlformats.org/officeDocument/2006/relationships" r:dm="rId3" r:lo="rId4" r:qs="rId5" r:cs="rId6"/>
+            <dgm:relIds xmlns:dgm="http://schemas.openxmlformats.org/drawingml/2006/diagram" xmlns:r="http://schemas.openxmlformats.org/officeDocument/2006/relationships" r:dm="rId4" r:lo="rId5" r:qs="rId6" r:cs="rId7"/>
           </a:graphicData>
         </a:graphic>
       </p:graphicFrame>
@@ -18840,7 +19008,7 @@
           <a:p>
             <a:r>
               <a:rPr lang="en-AU" dirty="0"/>
-              <a:t>No plot, best distance 25m </a:t>
+              <a:t>No plot, best distance: 25m </a:t>
             </a:r>
           </a:p>
         </p:txBody>
@@ -18892,7 +19060,7 @@
           </p:nvPr>
         </p:nvPicPr>
         <p:blipFill rotWithShape="1">
-          <a:blip r:embed="rId2">
+          <a:blip r:embed="rId3">
             <a:extLst>
               <a:ext uri="{28A0092B-C50C-407E-A947-70E740481C1C}">
                 <a14:useLocalDpi xmlns:a14="http://schemas.microsoft.com/office/drawing/2010/main" val="0"/>
@@ -19033,7 +19201,7 @@
               <a:buSzPct val="88000"/>
               <a:buFontTx/>
               <a:buBlip>
-                <a:blip r:embed="rId3"/>
+                <a:blip r:embed="rId4"/>
               </a:buBlip>
               <a:defRPr sz="2800" kern="1200">
                 <a:solidFill>
@@ -19054,7 +19222,7 @@
               <a:buSzPct val="88000"/>
               <a:buFontTx/>
               <a:buBlip>
-                <a:blip r:embed="rId3"/>
+                <a:blip r:embed="rId4"/>
               </a:buBlip>
               <a:defRPr sz="2400" kern="1200">
                 <a:solidFill>
@@ -19075,7 +19243,7 @@
               <a:buSzPct val="88000"/>
               <a:buFontTx/>
               <a:buBlip>
-                <a:blip r:embed="rId3"/>
+                <a:blip r:embed="rId4"/>
               </a:buBlip>
               <a:defRPr sz="2000" kern="1200">
                 <a:solidFill>
@@ -19096,7 +19264,7 @@
               <a:buSzPct val="88000"/>
               <a:buFontTx/>
               <a:buBlip>
-                <a:blip r:embed="rId3"/>
+                <a:blip r:embed="rId4"/>
               </a:buBlip>
               <a:defRPr sz="2000" kern="1200">
                 <a:solidFill>
@@ -19117,7 +19285,7 @@
               <a:buSzPct val="88000"/>
               <a:buFontTx/>
               <a:buBlip>
-                <a:blip r:embed="rId3"/>
+                <a:blip r:embed="rId4"/>
               </a:buBlip>
               <a:defRPr sz="2000" kern="1200">
                 <a:solidFill>

</xml_diff>